<commit_message>
miniSpring03: - 增加 bean 实例化模块
</commit_message>
<xml_diff>
--- a/miniSpring.pptx
+++ b/miniSpring.pptx
@@ -4128,10 +4128,10 @@
       </p:grpSpPr>
       <p:pic>
         <p:nvPicPr>
-          <p:cNvPr id="5" name="图片 4">
-            <a:extLst>
-              <a:ext uri="{FF2B5EF4-FFF2-40B4-BE49-F238E27FC236}">
-                <a16:creationId xmlns:a16="http://schemas.microsoft.com/office/drawing/2014/main" id="{0F877AAF-C29B-4A9A-864C-C076126C74FF}"/>
+          <p:cNvPr id="3" name="图片 2">
+            <a:extLst>
+              <a:ext uri="{FF2B5EF4-FFF2-40B4-BE49-F238E27FC236}">
+                <a16:creationId xmlns:a16="http://schemas.microsoft.com/office/drawing/2014/main" id="{A904E653-98BC-4AEC-AA26-D9FF345F224A}"/>
               </a:ext>
             </a:extLst>
           </p:cNvPr>
@@ -4148,737 +4148,813 @@
         </p:blipFill>
         <p:spPr>
           <a:xfrm>
-            <a:off x="3567428" y="1329000"/>
-            <a:ext cx="5057143" cy="4200000"/>
+            <a:off x="3376952" y="638524"/>
+            <a:ext cx="5438095" cy="5580952"/>
           </a:xfrm>
           <a:prstGeom prst="rect">
             <a:avLst/>
           </a:prstGeom>
         </p:spPr>
       </p:pic>
-      <p:sp>
-        <p:nvSpPr>
-          <p:cNvPr id="6" name="矩形 5">
-            <a:extLst>
-              <a:ext uri="{FF2B5EF4-FFF2-40B4-BE49-F238E27FC236}">
-                <a16:creationId xmlns:a16="http://schemas.microsoft.com/office/drawing/2014/main" id="{D3E064B5-D956-4CF8-9430-B5D38CEBC398}"/>
-              </a:ext>
-            </a:extLst>
-          </p:cNvPr>
-          <p:cNvSpPr/>
+      <p:grpSp>
+        <p:nvGrpSpPr>
+          <p:cNvPr id="4" name="组合 3">
+            <a:extLst>
+              <a:ext uri="{FF2B5EF4-FFF2-40B4-BE49-F238E27FC236}">
+                <a16:creationId xmlns:a16="http://schemas.microsoft.com/office/drawing/2014/main" id="{CA02973B-3736-42B0-AE0E-063D44985C50}"/>
+              </a:ext>
+            </a:extLst>
+          </p:cNvPr>
+          <p:cNvGrpSpPr/>
           <p:nvPr/>
-        </p:nvSpPr>
-        <p:spPr>
+        </p:nvGrpSpPr>
+        <p:grpSpPr>
           <a:xfrm>
-            <a:off x="5029201" y="1043610"/>
-            <a:ext cx="2196547" cy="1490868"/>
+            <a:off x="5803659" y="1043610"/>
+            <a:ext cx="2729469" cy="892471"/>
+            <a:chOff x="5803653" y="1043610"/>
+            <a:chExt cx="1675530" cy="892471"/>
           </a:xfrm>
-          <a:prstGeom prst="rect">
-            <a:avLst/>
-          </a:prstGeom>
-          <a:noFill/>
-          <a:ln w="19050">
-            <a:solidFill>
-              <a:schemeClr val="tx1">
-                <a:lumMod val="50000"/>
-                <a:lumOff val="50000"/>
+        </p:grpSpPr>
+        <p:sp>
+          <p:nvSpPr>
+            <p:cNvPr id="6" name="矩形 5">
+              <a:extLst>
+                <a:ext uri="{FF2B5EF4-FFF2-40B4-BE49-F238E27FC236}">
+                  <a16:creationId xmlns:a16="http://schemas.microsoft.com/office/drawing/2014/main" id="{D3E064B5-D956-4CF8-9430-B5D38CEBC398}"/>
+                </a:ext>
+              </a:extLst>
+            </p:cNvPr>
+            <p:cNvSpPr/>
+            <p:nvPr/>
+          </p:nvSpPr>
+          <p:spPr>
+            <a:xfrm>
+              <a:off x="5812039" y="1043610"/>
+              <a:ext cx="1667144" cy="892471"/>
+            </a:xfrm>
+            <a:prstGeom prst="rect">
+              <a:avLst/>
+            </a:prstGeom>
+            <a:noFill/>
+            <a:ln w="19050">
+              <a:solidFill>
+                <a:schemeClr val="tx1">
+                  <a:lumMod val="50000"/>
+                  <a:lumOff val="50000"/>
+                </a:schemeClr>
+              </a:solidFill>
+            </a:ln>
+          </p:spPr>
+          <p:style>
+            <a:lnRef idx="2">
+              <a:schemeClr val="accent1">
+                <a:shade val="50000"/>
               </a:schemeClr>
-            </a:solidFill>
-          </a:ln>
-        </p:spPr>
-        <p:style>
-          <a:lnRef idx="2">
-            <a:schemeClr val="accent1">
-              <a:shade val="50000"/>
-            </a:schemeClr>
-          </a:lnRef>
-          <a:fillRef idx="1">
-            <a:schemeClr val="accent1"/>
-          </a:fillRef>
-          <a:effectRef idx="0">
-            <a:schemeClr val="accent1"/>
-          </a:effectRef>
-          <a:fontRef idx="minor">
-            <a:schemeClr val="lt1"/>
-          </a:fontRef>
-        </p:style>
-        <p:txBody>
-          <a:bodyPr rtlCol="0" anchor="ctr"/>
-          <a:lstStyle/>
-          <a:p>
-            <a:pPr algn="ctr"/>
-            <a:endParaRPr lang="zh-CN" altLang="en-US"/>
-          </a:p>
-        </p:txBody>
-      </p:sp>
-      <p:sp>
-        <p:nvSpPr>
-          <p:cNvPr id="7" name="文本框 6">
-            <a:extLst>
-              <a:ext uri="{FF2B5EF4-FFF2-40B4-BE49-F238E27FC236}">
-                <a16:creationId xmlns:a16="http://schemas.microsoft.com/office/drawing/2014/main" id="{8C2EFBC7-96FC-4020-A1C0-2C1958ABD257}"/>
-              </a:ext>
-            </a:extLst>
-          </p:cNvPr>
-          <p:cNvSpPr txBox="1"/>
+            </a:lnRef>
+            <a:fillRef idx="1">
+              <a:schemeClr val="accent1"/>
+            </a:fillRef>
+            <a:effectRef idx="0">
+              <a:schemeClr val="accent1"/>
+            </a:effectRef>
+            <a:fontRef idx="minor">
+              <a:schemeClr val="lt1"/>
+            </a:fontRef>
+          </p:style>
+          <p:txBody>
+            <a:bodyPr rtlCol="0" anchor="ctr"/>
+            <a:lstStyle/>
+            <a:p>
+              <a:pPr algn="ctr"/>
+              <a:endParaRPr lang="zh-CN" altLang="en-US"/>
+            </a:p>
+          </p:txBody>
+        </p:sp>
+        <p:sp>
+          <p:nvSpPr>
+            <p:cNvPr id="7" name="文本框 6">
+              <a:extLst>
+                <a:ext uri="{FF2B5EF4-FFF2-40B4-BE49-F238E27FC236}">
+                  <a16:creationId xmlns:a16="http://schemas.microsoft.com/office/drawing/2014/main" id="{8C2EFBC7-96FC-4020-A1C0-2C1958ABD257}"/>
+                </a:ext>
+              </a:extLst>
+            </p:cNvPr>
+            <p:cNvSpPr txBox="1"/>
+            <p:nvPr/>
+          </p:nvSpPr>
+          <p:spPr>
+            <a:xfrm>
+              <a:off x="5803653" y="1043610"/>
+              <a:ext cx="1667144" cy="307777"/>
+            </a:xfrm>
+            <a:prstGeom prst="rect">
+              <a:avLst/>
+            </a:prstGeom>
+            <a:noFill/>
+          </p:spPr>
+          <p:txBody>
+            <a:bodyPr wrap="none" rtlCol="0">
+              <a:spAutoFit/>
+            </a:bodyPr>
+            <a:lstStyle/>
+            <a:p>
+              <a:r>
+                <a:rPr lang="zh-CN" altLang="en-US" sz="1400" dirty="0">
+                  <a:solidFill>
+                    <a:schemeClr val="bg2">
+                      <a:lumMod val="90000"/>
+                    </a:schemeClr>
+                  </a:solidFill>
+                </a:rPr>
+                <a:t>增加了添加参数的 </a:t>
+              </a:r>
+              <a:r>
+                <a:rPr lang="en-US" altLang="zh-CN" sz="1400" dirty="0">
+                  <a:solidFill>
+                    <a:schemeClr val="bg2">
+                      <a:lumMod val="90000"/>
+                    </a:schemeClr>
+                  </a:solidFill>
+                </a:rPr>
+                <a:t>getBean </a:t>
+              </a:r>
+              <a:r>
+                <a:rPr lang="zh-CN" altLang="en-US" sz="1400" dirty="0">
+                  <a:solidFill>
+                    <a:schemeClr val="bg2">
+                      <a:lumMod val="90000"/>
+                    </a:schemeClr>
+                  </a:solidFill>
+                </a:rPr>
+                <a:t>方法</a:t>
+              </a:r>
+            </a:p>
+          </p:txBody>
+        </p:sp>
+      </p:grpSp>
+      <p:grpSp>
+        <p:nvGrpSpPr>
+          <p:cNvPr id="19" name="组合 18">
+            <a:extLst>
+              <a:ext uri="{FF2B5EF4-FFF2-40B4-BE49-F238E27FC236}">
+                <a16:creationId xmlns:a16="http://schemas.microsoft.com/office/drawing/2014/main" id="{DB3AD9C5-363C-4DFD-A7CD-7667A1B7E524}"/>
+              </a:ext>
+            </a:extLst>
+          </p:cNvPr>
+          <p:cNvGrpSpPr/>
           <p:nvPr/>
-        </p:nvSpPr>
-        <p:spPr>
+        </p:nvGrpSpPr>
+        <p:grpSpPr>
           <a:xfrm>
-            <a:off x="5029201" y="1043610"/>
-            <a:ext cx="1386918" cy="307777"/>
+            <a:off x="472812" y="2817004"/>
+            <a:ext cx="6385187" cy="505618"/>
+            <a:chOff x="5803653" y="1043610"/>
+            <a:chExt cx="1422095" cy="892471"/>
           </a:xfrm>
-          <a:prstGeom prst="rect">
-            <a:avLst/>
-          </a:prstGeom>
-          <a:noFill/>
-        </p:spPr>
-        <p:txBody>
-          <a:bodyPr wrap="none" rtlCol="0">
-            <a:spAutoFit/>
-          </a:bodyPr>
-          <a:lstStyle/>
-          <a:p>
-            <a:r>
-              <a:rPr lang="zh-CN" altLang="en-US" sz="1400" dirty="0">
+        </p:grpSpPr>
+        <p:sp>
+          <p:nvSpPr>
+            <p:cNvPr id="20" name="矩形 19">
+              <a:extLst>
+                <a:ext uri="{FF2B5EF4-FFF2-40B4-BE49-F238E27FC236}">
+                  <a16:creationId xmlns:a16="http://schemas.microsoft.com/office/drawing/2014/main" id="{47D5FDDF-8F18-4D0C-A728-3389051D4EA7}"/>
+                </a:ext>
+              </a:extLst>
+            </p:cNvPr>
+            <p:cNvSpPr/>
+            <p:nvPr/>
+          </p:nvSpPr>
+          <p:spPr>
+            <a:xfrm>
+              <a:off x="5812039" y="1043610"/>
+              <a:ext cx="1413709" cy="892471"/>
+            </a:xfrm>
+            <a:prstGeom prst="rect">
+              <a:avLst/>
+            </a:prstGeom>
+            <a:noFill/>
+            <a:ln w="19050">
+              <a:solidFill>
+                <a:schemeClr val="tx1">
+                  <a:lumMod val="50000"/>
+                  <a:lumOff val="50000"/>
+                </a:schemeClr>
+              </a:solidFill>
+            </a:ln>
+          </p:spPr>
+          <p:style>
+            <a:lnRef idx="2">
+              <a:schemeClr val="accent1">
+                <a:shade val="50000"/>
+              </a:schemeClr>
+            </a:lnRef>
+            <a:fillRef idx="1">
+              <a:schemeClr val="accent1"/>
+            </a:fillRef>
+            <a:effectRef idx="0">
+              <a:schemeClr val="accent1"/>
+            </a:effectRef>
+            <a:fontRef idx="minor">
+              <a:schemeClr val="lt1"/>
+            </a:fontRef>
+          </p:style>
+          <p:txBody>
+            <a:bodyPr rtlCol="0" anchor="ctr"/>
+            <a:lstStyle/>
+            <a:p>
+              <a:pPr algn="ctr"/>
+              <a:endParaRPr lang="zh-CN" altLang="en-US"/>
+            </a:p>
+          </p:txBody>
+        </p:sp>
+        <p:sp>
+          <p:nvSpPr>
+            <p:cNvPr id="21" name="文本框 20">
+              <a:extLst>
+                <a:ext uri="{FF2B5EF4-FFF2-40B4-BE49-F238E27FC236}">
+                  <a16:creationId xmlns:a16="http://schemas.microsoft.com/office/drawing/2014/main" id="{960E0060-5961-455B-BDE8-A3E088544379}"/>
+                </a:ext>
+              </a:extLst>
+            </p:cNvPr>
+            <p:cNvSpPr txBox="1"/>
+            <p:nvPr/>
+          </p:nvSpPr>
+          <p:spPr>
+            <a:xfrm>
+              <a:off x="5803653" y="1043610"/>
+              <a:ext cx="1046612" cy="483426"/>
+            </a:xfrm>
+            <a:prstGeom prst="rect">
+              <a:avLst/>
+            </a:prstGeom>
+            <a:noFill/>
+          </p:spPr>
+          <p:txBody>
+            <a:bodyPr wrap="none" rtlCol="0">
+              <a:spAutoFit/>
+            </a:bodyPr>
+            <a:lstStyle/>
+            <a:p>
+              <a:r>
+                <a:rPr lang="zh-CN" altLang="en-US" sz="1400" dirty="0">
+                  <a:solidFill>
+                    <a:schemeClr val="bg2">
+                      <a:lumMod val="90000"/>
+                    </a:schemeClr>
+                  </a:solidFill>
+                </a:rPr>
+                <a:t>此层接入了实例化操作 </a:t>
+              </a:r>
+              <a:r>
+                <a:rPr lang="en-US" altLang="zh-CN" sz="1400" dirty="0">
+                  <a:solidFill>
+                    <a:schemeClr val="bg2">
+                      <a:lumMod val="90000"/>
+                    </a:schemeClr>
+                  </a:solidFill>
+                </a:rPr>
+                <a:t>Instantiation Strategy</a:t>
+              </a:r>
+              <a:endParaRPr lang="zh-CN" altLang="en-US" sz="1400" dirty="0">
                 <a:solidFill>
                   <a:schemeClr val="bg2">
                     <a:lumMod val="90000"/>
                   </a:schemeClr>
                 </a:solidFill>
-              </a:rPr>
-              <a:t>单例</a:t>
-            </a:r>
-            <a:r>
-              <a:rPr lang="en-US" altLang="zh-CN" sz="1400" dirty="0">
-                <a:solidFill>
-                  <a:schemeClr val="bg2">
-                    <a:lumMod val="90000"/>
-                  </a:schemeClr>
-                </a:solidFill>
-              </a:rPr>
-              <a:t> bean </a:t>
-            </a:r>
-            <a:r>
-              <a:rPr lang="zh-CN" altLang="en-US" sz="1400" dirty="0">
-                <a:solidFill>
-                  <a:schemeClr val="bg2">
-                    <a:lumMod val="90000"/>
-                  </a:schemeClr>
-                </a:solidFill>
-              </a:rPr>
-              <a:t>接口</a:t>
-            </a:r>
-          </a:p>
-        </p:txBody>
-      </p:sp>
-      <p:sp>
-        <p:nvSpPr>
-          <p:cNvPr id="8" name="矩形 7">
-            <a:extLst>
-              <a:ext uri="{FF2B5EF4-FFF2-40B4-BE49-F238E27FC236}">
-                <a16:creationId xmlns:a16="http://schemas.microsoft.com/office/drawing/2014/main" id="{6ED6A499-FC8D-444C-B522-6AD60769BE25}"/>
-              </a:ext>
-            </a:extLst>
-          </p:cNvPr>
-          <p:cNvSpPr/>
+              </a:endParaRPr>
+            </a:p>
+          </p:txBody>
+        </p:sp>
+      </p:grpSp>
+      <p:grpSp>
+        <p:nvGrpSpPr>
+          <p:cNvPr id="22" name="组合 21">
+            <a:extLst>
+              <a:ext uri="{FF2B5EF4-FFF2-40B4-BE49-F238E27FC236}">
+                <a16:creationId xmlns:a16="http://schemas.microsoft.com/office/drawing/2014/main" id="{7447F4F5-3429-48B6-9248-801999E1CBDD}"/>
+              </a:ext>
+            </a:extLst>
+          </p:cNvPr>
+          <p:cNvGrpSpPr/>
           <p:nvPr/>
-        </p:nvSpPr>
-        <p:spPr>
+        </p:nvGrpSpPr>
+        <p:grpSpPr>
           <a:xfrm>
-            <a:off x="2872409" y="1669774"/>
-            <a:ext cx="2057400" cy="934278"/>
+            <a:off x="3796748" y="4248722"/>
+            <a:ext cx="3274239" cy="568199"/>
+            <a:chOff x="5803653" y="1043610"/>
+            <a:chExt cx="1422095" cy="892471"/>
           </a:xfrm>
-          <a:prstGeom prst="rect">
-            <a:avLst/>
-          </a:prstGeom>
-          <a:noFill/>
-          <a:ln w="19050">
-            <a:solidFill>
-              <a:schemeClr val="tx1">
-                <a:lumMod val="50000"/>
-                <a:lumOff val="50000"/>
-              </a:schemeClr>
-            </a:solidFill>
-          </a:ln>
-        </p:spPr>
-        <p:style>
-          <a:lnRef idx="2">
-            <a:schemeClr val="accent1">
-              <a:shade val="50000"/>
-            </a:schemeClr>
-          </a:lnRef>
-          <a:fillRef idx="1">
-            <a:schemeClr val="accent1"/>
-          </a:fillRef>
-          <a:effectRef idx="0">
-            <a:schemeClr val="accent1"/>
-          </a:effectRef>
-          <a:fontRef idx="minor">
-            <a:schemeClr val="lt1"/>
-          </a:fontRef>
-        </p:style>
-        <p:txBody>
-          <a:bodyPr rtlCol="0" anchor="ctr"/>
-          <a:lstStyle/>
-          <a:p>
-            <a:pPr algn="ctr"/>
-            <a:endParaRPr lang="zh-CN" altLang="en-US"/>
-          </a:p>
-        </p:txBody>
-      </p:sp>
-      <p:sp>
-        <p:nvSpPr>
-          <p:cNvPr id="9" name="文本框 8">
-            <a:extLst>
-              <a:ext uri="{FF2B5EF4-FFF2-40B4-BE49-F238E27FC236}">
-                <a16:creationId xmlns:a16="http://schemas.microsoft.com/office/drawing/2014/main" id="{585AA105-A0A4-4029-BC39-9B446CFE938E}"/>
-              </a:ext>
-            </a:extLst>
-          </p:cNvPr>
-          <p:cNvSpPr txBox="1"/>
-          <p:nvPr/>
-        </p:nvSpPr>
-        <p:spPr>
-          <a:xfrm>
-            <a:off x="2872409" y="1669774"/>
-            <a:ext cx="1337226" cy="307777"/>
-          </a:xfrm>
-          <a:prstGeom prst="rect">
-            <a:avLst/>
-          </a:prstGeom>
-          <a:noFill/>
-        </p:spPr>
-        <p:txBody>
-          <a:bodyPr wrap="none" rtlCol="0">
-            <a:spAutoFit/>
-          </a:bodyPr>
-          <a:lstStyle/>
-          <a:p>
-            <a:r>
-              <a:rPr lang="en-US" altLang="zh-CN" sz="1400" dirty="0">
-                <a:solidFill>
-                  <a:schemeClr val="bg2">
-                    <a:lumMod val="90000"/>
-                  </a:schemeClr>
-                </a:solidFill>
-              </a:rPr>
-              <a:t>bean </a:t>
-            </a:r>
-            <a:r>
-              <a:rPr lang="zh-CN" altLang="en-US" sz="1400" dirty="0">
-                <a:solidFill>
-                  <a:schemeClr val="bg2">
-                    <a:lumMod val="90000"/>
-                  </a:schemeClr>
-                </a:solidFill>
-              </a:rPr>
-              <a:t>工厂标准</a:t>
-            </a:r>
-          </a:p>
-        </p:txBody>
-      </p:sp>
-      <p:sp>
-        <p:nvSpPr>
-          <p:cNvPr id="10" name="矩形 9">
-            <a:extLst>
-              <a:ext uri="{FF2B5EF4-FFF2-40B4-BE49-F238E27FC236}">
-                <a16:creationId xmlns:a16="http://schemas.microsoft.com/office/drawing/2014/main" id="{06747D66-70FE-4F59-BC71-D7A100AA3750}"/>
-              </a:ext>
-            </a:extLst>
-          </p:cNvPr>
-          <p:cNvSpPr/>
-          <p:nvPr/>
-        </p:nvSpPr>
-        <p:spPr>
-          <a:xfrm>
-            <a:off x="924339" y="2819868"/>
-            <a:ext cx="5203135" cy="609132"/>
-          </a:xfrm>
-          <a:prstGeom prst="rect">
-            <a:avLst/>
-          </a:prstGeom>
-          <a:noFill/>
-          <a:ln w="19050">
-            <a:solidFill>
-              <a:schemeClr val="tx1">
-                <a:lumMod val="50000"/>
-                <a:lumOff val="50000"/>
-              </a:schemeClr>
-            </a:solidFill>
-          </a:ln>
-        </p:spPr>
-        <p:style>
-          <a:lnRef idx="2">
-            <a:schemeClr val="accent1">
-              <a:shade val="50000"/>
-            </a:schemeClr>
-          </a:lnRef>
-          <a:fillRef idx="1">
-            <a:schemeClr val="accent1"/>
-          </a:fillRef>
-          <a:effectRef idx="0">
-            <a:schemeClr val="accent1"/>
-          </a:effectRef>
-          <a:fontRef idx="minor">
-            <a:schemeClr val="lt1"/>
-          </a:fontRef>
-        </p:style>
-        <p:txBody>
-          <a:bodyPr rtlCol="0" anchor="ctr"/>
-          <a:lstStyle/>
-          <a:p>
-            <a:pPr algn="ctr"/>
-            <a:endParaRPr lang="zh-CN" altLang="en-US"/>
-          </a:p>
-        </p:txBody>
-      </p:sp>
-      <p:sp>
-        <p:nvSpPr>
-          <p:cNvPr id="11" name="文本框 10">
-            <a:extLst>
-              <a:ext uri="{FF2B5EF4-FFF2-40B4-BE49-F238E27FC236}">
-                <a16:creationId xmlns:a16="http://schemas.microsoft.com/office/drawing/2014/main" id="{31CDC12D-3C2D-4AE0-91CE-729B93D8D9CF}"/>
-              </a:ext>
-            </a:extLst>
-          </p:cNvPr>
-          <p:cNvSpPr txBox="1"/>
-          <p:nvPr/>
-        </p:nvSpPr>
-        <p:spPr>
-          <a:xfrm>
-            <a:off x="924339" y="2816657"/>
-            <a:ext cx="3773790" cy="523220"/>
-          </a:xfrm>
-          <a:prstGeom prst="rect">
-            <a:avLst/>
-          </a:prstGeom>
-          <a:noFill/>
-        </p:spPr>
-        <p:txBody>
-          <a:bodyPr wrap="none" rtlCol="0">
-            <a:spAutoFit/>
-          </a:bodyPr>
-          <a:lstStyle/>
-          <a:p>
-            <a:r>
-              <a:rPr lang="zh-CN" altLang="en-US" sz="1400" dirty="0">
-                <a:solidFill>
-                  <a:schemeClr val="bg2">
-                    <a:lumMod val="90000"/>
-                  </a:schemeClr>
-                </a:solidFill>
-              </a:rPr>
-              <a:t>实现工厂 </a:t>
-            </a:r>
-            <a:r>
-              <a:rPr lang="en-US" altLang="zh-CN" sz="1400" dirty="0">
-                <a:solidFill>
-                  <a:schemeClr val="bg2">
-                    <a:lumMod val="90000"/>
-                  </a:schemeClr>
-                </a:solidFill>
-              </a:rPr>
-              <a:t>getBean() </a:t>
-            </a:r>
-            <a:r>
-              <a:rPr lang="zh-CN" altLang="en-US" sz="1400" dirty="0">
-                <a:solidFill>
-                  <a:schemeClr val="bg2">
-                    <a:lumMod val="90000"/>
-                  </a:schemeClr>
-                </a:solidFill>
-              </a:rPr>
-              <a:t>接口</a:t>
-            </a:r>
-            <a:br>
-              <a:rPr lang="en-US" altLang="zh-CN" sz="1400" dirty="0">
-                <a:solidFill>
-                  <a:schemeClr val="bg2">
-                    <a:lumMod val="90000"/>
-                  </a:schemeClr>
-                </a:solidFill>
-              </a:rPr>
-            </a:br>
-            <a:r>
-              <a:rPr lang="zh-CN" altLang="en-US" sz="1400" dirty="0">
-                <a:solidFill>
-                  <a:schemeClr val="bg2">
-                    <a:lumMod val="90000"/>
-                  </a:schemeClr>
-                </a:solidFill>
-              </a:rPr>
-              <a:t>规定获取 </a:t>
-            </a:r>
-            <a:r>
-              <a:rPr lang="en-US" altLang="zh-CN" sz="1400" dirty="0">
-                <a:solidFill>
-                  <a:schemeClr val="bg2">
-                    <a:lumMod val="90000"/>
-                  </a:schemeClr>
-                </a:solidFill>
-              </a:rPr>
-              <a:t>beanDefinition </a:t>
-            </a:r>
-            <a:r>
-              <a:rPr lang="zh-CN" altLang="en-US" sz="1400" dirty="0">
-                <a:solidFill>
-                  <a:schemeClr val="bg2">
-                    <a:lumMod val="90000"/>
-                  </a:schemeClr>
-                </a:solidFill>
-              </a:rPr>
-              <a:t>和 </a:t>
-            </a:r>
-            <a:r>
-              <a:rPr lang="en-US" altLang="zh-CN" sz="1400" dirty="0">
-                <a:solidFill>
-                  <a:schemeClr val="bg2">
-                    <a:lumMod val="90000"/>
-                  </a:schemeClr>
-                </a:solidFill>
-              </a:rPr>
-              <a:t>createBean </a:t>
-            </a:r>
-            <a:r>
-              <a:rPr lang="zh-CN" altLang="en-US" sz="1400" dirty="0">
-                <a:solidFill>
-                  <a:schemeClr val="bg2">
-                    <a:lumMod val="90000"/>
-                  </a:schemeClr>
-                </a:solidFill>
-              </a:rPr>
-              <a:t>接口</a:t>
-            </a:r>
-          </a:p>
-        </p:txBody>
-      </p:sp>
-      <p:sp>
-        <p:nvSpPr>
-          <p:cNvPr id="12" name="文本框 11">
-            <a:extLst>
-              <a:ext uri="{FF2B5EF4-FFF2-40B4-BE49-F238E27FC236}">
-                <a16:creationId xmlns:a16="http://schemas.microsoft.com/office/drawing/2014/main" id="{17694958-DC02-4799-BDCF-AE1D6746B15B}"/>
-              </a:ext>
-            </a:extLst>
-          </p:cNvPr>
-          <p:cNvSpPr txBox="1"/>
-          <p:nvPr/>
-        </p:nvSpPr>
-        <p:spPr>
-          <a:xfrm>
-            <a:off x="2494722" y="3644816"/>
-            <a:ext cx="4002390" cy="307777"/>
-          </a:xfrm>
-          <a:prstGeom prst="rect">
-            <a:avLst/>
-          </a:prstGeom>
-          <a:noFill/>
-          <a:ln>
-            <a:solidFill>
-              <a:schemeClr val="bg2">
-                <a:lumMod val="75000"/>
-              </a:schemeClr>
-            </a:solidFill>
-          </a:ln>
-        </p:spPr>
-        <p:txBody>
-          <a:bodyPr wrap="square" rtlCol="0">
-            <a:spAutoFit/>
-          </a:bodyPr>
-          <a:lstStyle/>
-          <a:p>
-            <a:r>
-              <a:rPr lang="zh-CN" altLang="en-US" sz="1400" dirty="0">
-                <a:solidFill>
-                  <a:schemeClr val="bg2">
-                    <a:lumMod val="90000"/>
-                  </a:schemeClr>
-                </a:solidFill>
-              </a:rPr>
-              <a:t>实现 </a:t>
-            </a:r>
-            <a:r>
-              <a:rPr lang="en-US" altLang="zh-CN" sz="1400" dirty="0">
-                <a:solidFill>
-                  <a:schemeClr val="bg2">
-                    <a:lumMod val="90000"/>
-                  </a:schemeClr>
-                </a:solidFill>
-              </a:rPr>
-              <a:t>createBean</a:t>
-            </a:r>
-            <a:endParaRPr lang="zh-CN" altLang="en-US" sz="1400" dirty="0">
+        </p:grpSpPr>
+        <p:sp>
+          <p:nvSpPr>
+            <p:cNvPr id="23" name="矩形 22">
+              <a:extLst>
+                <a:ext uri="{FF2B5EF4-FFF2-40B4-BE49-F238E27FC236}">
+                  <a16:creationId xmlns:a16="http://schemas.microsoft.com/office/drawing/2014/main" id="{7EFA29A7-24AF-4AEA-9C81-62B68104348D}"/>
+                </a:ext>
+              </a:extLst>
+            </p:cNvPr>
+            <p:cNvSpPr/>
+            <p:nvPr/>
+          </p:nvSpPr>
+          <p:spPr>
+            <a:xfrm>
+              <a:off x="5812039" y="1043610"/>
+              <a:ext cx="1413709" cy="892471"/>
+            </a:xfrm>
+            <a:prstGeom prst="rect">
+              <a:avLst/>
+            </a:prstGeom>
+            <a:noFill/>
+            <a:ln w="19050">
               <a:solidFill>
-                <a:schemeClr val="bg2">
-                  <a:lumMod val="90000"/>
+                <a:schemeClr val="tx1">
+                  <a:lumMod val="50000"/>
+                  <a:lumOff val="50000"/>
                 </a:schemeClr>
               </a:solidFill>
-            </a:endParaRPr>
-          </a:p>
-        </p:txBody>
-      </p:sp>
-      <p:sp>
-        <p:nvSpPr>
-          <p:cNvPr id="14" name="矩形 13">
-            <a:extLst>
-              <a:ext uri="{FF2B5EF4-FFF2-40B4-BE49-F238E27FC236}">
-                <a16:creationId xmlns:a16="http://schemas.microsoft.com/office/drawing/2014/main" id="{A934402B-B6DA-47DC-9720-B00228AC6061}"/>
-              </a:ext>
-            </a:extLst>
-          </p:cNvPr>
-          <p:cNvSpPr/>
+            </a:ln>
+          </p:spPr>
+          <p:style>
+            <a:lnRef idx="2">
+              <a:schemeClr val="accent1">
+                <a:shade val="50000"/>
+              </a:schemeClr>
+            </a:lnRef>
+            <a:fillRef idx="1">
+              <a:schemeClr val="accent1"/>
+            </a:fillRef>
+            <a:effectRef idx="0">
+              <a:schemeClr val="accent1"/>
+            </a:effectRef>
+            <a:fontRef idx="minor">
+              <a:schemeClr val="lt1"/>
+            </a:fontRef>
+          </p:style>
+          <p:txBody>
+            <a:bodyPr rtlCol="0" anchor="ctr"/>
+            <a:lstStyle/>
+            <a:p>
+              <a:pPr algn="ctr"/>
+              <a:endParaRPr lang="zh-CN" altLang="en-US"/>
+            </a:p>
+          </p:txBody>
+        </p:sp>
+        <p:sp>
+          <p:nvSpPr>
+            <p:cNvPr id="24" name="文本框 23">
+              <a:extLst>
+                <a:ext uri="{FF2B5EF4-FFF2-40B4-BE49-F238E27FC236}">
+                  <a16:creationId xmlns:a16="http://schemas.microsoft.com/office/drawing/2014/main" id="{66C2D0EE-B69A-4D4D-9E5E-EE603AB68106}"/>
+                </a:ext>
+              </a:extLst>
+            </p:cNvPr>
+            <p:cNvSpPr txBox="1"/>
+            <p:nvPr/>
+          </p:nvSpPr>
+          <p:spPr>
+            <a:xfrm>
+              <a:off x="5803653" y="1043610"/>
+              <a:ext cx="1046612" cy="483426"/>
+            </a:xfrm>
+            <a:prstGeom prst="rect">
+              <a:avLst/>
+            </a:prstGeom>
+            <a:noFill/>
+          </p:spPr>
+          <p:txBody>
+            <a:bodyPr wrap="square" rtlCol="0">
+              <a:spAutoFit/>
+            </a:bodyPr>
+            <a:lstStyle/>
+            <a:p>
+              <a:r>
+                <a:rPr lang="zh-CN" altLang="en-US" sz="1400" dirty="0">
+                  <a:solidFill>
+                    <a:schemeClr val="bg2">
+                      <a:lumMod val="90000"/>
+                    </a:schemeClr>
+                  </a:solidFill>
+                </a:rPr>
+                <a:t>实例化操作接口</a:t>
+              </a:r>
+            </a:p>
+          </p:txBody>
+        </p:sp>
+      </p:grpSp>
+      <p:grpSp>
+        <p:nvGrpSpPr>
+          <p:cNvPr id="25" name="组合 24">
+            <a:extLst>
+              <a:ext uri="{FF2B5EF4-FFF2-40B4-BE49-F238E27FC236}">
+                <a16:creationId xmlns:a16="http://schemas.microsoft.com/office/drawing/2014/main" id="{13C902EB-11E8-4534-869D-8B45BEE64D56}"/>
+              </a:ext>
+            </a:extLst>
+          </p:cNvPr>
+          <p:cNvGrpSpPr/>
           <p:nvPr/>
-        </p:nvSpPr>
-        <p:spPr>
+        </p:nvGrpSpPr>
+        <p:grpSpPr>
           <a:xfrm>
-            <a:off x="6610693" y="3200400"/>
-            <a:ext cx="2196547" cy="834887"/>
+            <a:off x="1560443" y="4982793"/>
+            <a:ext cx="4535557" cy="568199"/>
+            <a:chOff x="5803653" y="1043610"/>
+            <a:chExt cx="1422095" cy="892471"/>
           </a:xfrm>
-          <a:prstGeom prst="rect">
-            <a:avLst/>
-          </a:prstGeom>
-          <a:noFill/>
-          <a:ln w="19050">
-            <a:solidFill>
-              <a:schemeClr val="tx1">
-                <a:lumMod val="50000"/>
-                <a:lumOff val="50000"/>
-              </a:schemeClr>
-            </a:solidFill>
-          </a:ln>
-        </p:spPr>
-        <p:style>
-          <a:lnRef idx="2">
-            <a:schemeClr val="accent1">
-              <a:shade val="50000"/>
-            </a:schemeClr>
-          </a:lnRef>
-          <a:fillRef idx="1">
-            <a:schemeClr val="accent1"/>
-          </a:fillRef>
-          <a:effectRef idx="0">
-            <a:schemeClr val="accent1"/>
-          </a:effectRef>
-          <a:fontRef idx="minor">
-            <a:schemeClr val="lt1"/>
-          </a:fontRef>
-        </p:style>
-        <p:txBody>
-          <a:bodyPr rtlCol="0" anchor="ctr"/>
-          <a:lstStyle/>
-          <a:p>
-            <a:pPr algn="ctr"/>
-            <a:endParaRPr lang="zh-CN" altLang="en-US"/>
-          </a:p>
-        </p:txBody>
-      </p:sp>
-      <p:sp>
-        <p:nvSpPr>
-          <p:cNvPr id="15" name="文本框 14">
-            <a:extLst>
-              <a:ext uri="{FF2B5EF4-FFF2-40B4-BE49-F238E27FC236}">
-                <a16:creationId xmlns:a16="http://schemas.microsoft.com/office/drawing/2014/main" id="{8937B428-EB31-41D0-A924-957B32769A16}"/>
-              </a:ext>
-            </a:extLst>
-          </p:cNvPr>
-          <p:cNvSpPr txBox="1"/>
-          <p:nvPr/>
-        </p:nvSpPr>
-        <p:spPr>
-          <a:xfrm>
-            <a:off x="6682562" y="3275111"/>
-            <a:ext cx="1865089" cy="307777"/>
-          </a:xfrm>
-          <a:prstGeom prst="rect">
-            <a:avLst/>
-          </a:prstGeom>
-          <a:noFill/>
-        </p:spPr>
-        <p:txBody>
-          <a:bodyPr wrap="square" rtlCol="0">
-            <a:spAutoFit/>
-          </a:bodyPr>
-          <a:lstStyle/>
-          <a:p>
-            <a:r>
-              <a:rPr lang="en-US" altLang="zh-CN" sz="1400" dirty="0">
-                <a:solidFill>
-                  <a:schemeClr val="bg2">
-                    <a:lumMod val="90000"/>
-                  </a:schemeClr>
-                </a:solidFill>
-              </a:rPr>
-              <a:t>bean </a:t>
-            </a:r>
-            <a:r>
-              <a:rPr lang="zh-CN" altLang="en-US" sz="1400" dirty="0">
-                <a:solidFill>
-                  <a:schemeClr val="bg2">
-                    <a:lumMod val="90000"/>
-                  </a:schemeClr>
-                </a:solidFill>
-              </a:rPr>
-              <a:t>注册接口</a:t>
-            </a:r>
-          </a:p>
-        </p:txBody>
-      </p:sp>
-      <p:sp>
-        <p:nvSpPr>
-          <p:cNvPr id="16" name="矩形 15">
-            <a:extLst>
-              <a:ext uri="{FF2B5EF4-FFF2-40B4-BE49-F238E27FC236}">
-                <a16:creationId xmlns:a16="http://schemas.microsoft.com/office/drawing/2014/main" id="{185CA695-CD10-4154-AC9A-080BCAA9C6A5}"/>
-              </a:ext>
-            </a:extLst>
-          </p:cNvPr>
-          <p:cNvSpPr/>
-          <p:nvPr/>
-        </p:nvSpPr>
-        <p:spPr>
-          <a:xfrm>
-            <a:off x="586409" y="4283028"/>
-            <a:ext cx="7028697" cy="597418"/>
-          </a:xfrm>
-          <a:prstGeom prst="rect">
-            <a:avLst/>
-          </a:prstGeom>
-          <a:noFill/>
-          <a:ln w="19050">
-            <a:solidFill>
-              <a:schemeClr val="tx1">
-                <a:lumMod val="50000"/>
-                <a:lumOff val="50000"/>
-              </a:schemeClr>
-            </a:solidFill>
-          </a:ln>
-        </p:spPr>
-        <p:style>
-          <a:lnRef idx="2">
-            <a:schemeClr val="accent1">
-              <a:shade val="50000"/>
-            </a:schemeClr>
-          </a:lnRef>
-          <a:fillRef idx="1">
-            <a:schemeClr val="accent1"/>
-          </a:fillRef>
-          <a:effectRef idx="0">
-            <a:schemeClr val="accent1"/>
-          </a:effectRef>
-          <a:fontRef idx="minor">
-            <a:schemeClr val="lt1"/>
-          </a:fontRef>
-        </p:style>
-        <p:txBody>
-          <a:bodyPr rtlCol="0" anchor="ctr"/>
-          <a:lstStyle/>
-          <a:p>
-            <a:pPr algn="ctr"/>
-            <a:endParaRPr lang="zh-CN" altLang="en-US"/>
-          </a:p>
-        </p:txBody>
-      </p:sp>
-      <p:sp>
-        <p:nvSpPr>
-          <p:cNvPr id="18" name="文本框 17">
-            <a:extLst>
-              <a:ext uri="{FF2B5EF4-FFF2-40B4-BE49-F238E27FC236}">
-                <a16:creationId xmlns:a16="http://schemas.microsoft.com/office/drawing/2014/main" id="{A13F5BB5-3143-432E-9A82-5D091F21FB99}"/>
-              </a:ext>
-            </a:extLst>
-          </p:cNvPr>
-          <p:cNvSpPr txBox="1"/>
-          <p:nvPr/>
-        </p:nvSpPr>
-        <p:spPr>
-          <a:xfrm>
-            <a:off x="665517" y="4292230"/>
-            <a:ext cx="5057143" cy="523220"/>
-          </a:xfrm>
-          <a:prstGeom prst="rect">
-            <a:avLst/>
-          </a:prstGeom>
-          <a:noFill/>
-        </p:spPr>
-        <p:txBody>
-          <a:bodyPr wrap="square" rtlCol="0">
-            <a:spAutoFit/>
-          </a:bodyPr>
-          <a:lstStyle/>
-          <a:p>
-            <a:r>
-              <a:rPr lang="zh-CN" altLang="en-US" sz="1400" dirty="0">
-                <a:solidFill>
-                  <a:schemeClr val="bg2">
-                    <a:lumMod val="90000"/>
-                  </a:schemeClr>
-                </a:solidFill>
-              </a:rPr>
-              <a:t>存储 </a:t>
-            </a:r>
-            <a:r>
-              <a:rPr lang="en-US" altLang="zh-CN" sz="1400" dirty="0">
-                <a:solidFill>
-                  <a:schemeClr val="bg2">
-                    <a:lumMod val="90000"/>
-                  </a:schemeClr>
-                </a:solidFill>
-              </a:rPr>
-              <a:t>&lt;beanName, beanDefinition&gt;</a:t>
-            </a:r>
-          </a:p>
-          <a:p>
-            <a:r>
-              <a:rPr lang="zh-CN" altLang="en-US" sz="1400" dirty="0">
-                <a:solidFill>
-                  <a:schemeClr val="bg2">
-                    <a:lumMod val="90000"/>
-                  </a:schemeClr>
-                </a:solidFill>
-              </a:rPr>
-              <a:t>实现 </a:t>
-            </a:r>
-            <a:r>
-              <a:rPr lang="en-US" altLang="zh-CN" sz="1400" dirty="0">
-                <a:solidFill>
-                  <a:schemeClr val="bg2">
-                    <a:lumMod val="90000"/>
-                  </a:schemeClr>
-                </a:solidFill>
-              </a:rPr>
-              <a:t>registerBeanDefinition </a:t>
-            </a:r>
-            <a:r>
-              <a:rPr lang="zh-CN" altLang="en-US" sz="1400" dirty="0">
-                <a:solidFill>
-                  <a:schemeClr val="bg2">
-                    <a:lumMod val="90000"/>
-                  </a:schemeClr>
-                </a:solidFill>
-              </a:rPr>
-              <a:t>和 </a:t>
-            </a:r>
-            <a:r>
-              <a:rPr lang="en-US" altLang="zh-CN" sz="1400" dirty="0">
-                <a:solidFill>
-                  <a:schemeClr val="bg2">
-                    <a:lumMod val="90000"/>
-                  </a:schemeClr>
-                </a:solidFill>
-              </a:rPr>
-              <a:t>getBeanDefinition</a:t>
-            </a:r>
-            <a:endParaRPr lang="zh-CN" altLang="en-US" sz="1400" dirty="0">
+        </p:grpSpPr>
+        <p:sp>
+          <p:nvSpPr>
+            <p:cNvPr id="26" name="矩形 25">
+              <a:extLst>
+                <a:ext uri="{FF2B5EF4-FFF2-40B4-BE49-F238E27FC236}">
+                  <a16:creationId xmlns:a16="http://schemas.microsoft.com/office/drawing/2014/main" id="{7694F715-B42F-4186-ADAF-E61DBC39F7B4}"/>
+                </a:ext>
+              </a:extLst>
+            </p:cNvPr>
+            <p:cNvSpPr/>
+            <p:nvPr/>
+          </p:nvSpPr>
+          <p:spPr>
+            <a:xfrm>
+              <a:off x="5812039" y="1043610"/>
+              <a:ext cx="1413709" cy="892471"/>
+            </a:xfrm>
+            <a:prstGeom prst="rect">
+              <a:avLst/>
+            </a:prstGeom>
+            <a:noFill/>
+            <a:ln w="19050">
               <a:solidFill>
-                <a:schemeClr val="bg2">
-                  <a:lumMod val="90000"/>
+                <a:schemeClr val="tx1">
+                  <a:lumMod val="50000"/>
+                  <a:lumOff val="50000"/>
                 </a:schemeClr>
               </a:solidFill>
-            </a:endParaRPr>
-          </a:p>
-        </p:txBody>
-      </p:sp>
+            </a:ln>
+          </p:spPr>
+          <p:style>
+            <a:lnRef idx="2">
+              <a:schemeClr val="accent1">
+                <a:shade val="50000"/>
+              </a:schemeClr>
+            </a:lnRef>
+            <a:fillRef idx="1">
+              <a:schemeClr val="accent1"/>
+            </a:fillRef>
+            <a:effectRef idx="0">
+              <a:schemeClr val="accent1"/>
+            </a:effectRef>
+            <a:fontRef idx="minor">
+              <a:schemeClr val="lt1"/>
+            </a:fontRef>
+          </p:style>
+          <p:txBody>
+            <a:bodyPr rtlCol="0" anchor="ctr"/>
+            <a:lstStyle/>
+            <a:p>
+              <a:pPr algn="ctr"/>
+              <a:endParaRPr lang="zh-CN" altLang="en-US"/>
+            </a:p>
+          </p:txBody>
+        </p:sp>
+        <p:sp>
+          <p:nvSpPr>
+            <p:cNvPr id="27" name="文本框 26">
+              <a:extLst>
+                <a:ext uri="{FF2B5EF4-FFF2-40B4-BE49-F238E27FC236}">
+                  <a16:creationId xmlns:a16="http://schemas.microsoft.com/office/drawing/2014/main" id="{D9385835-418F-4371-A4C1-335DF4C80175}"/>
+                </a:ext>
+              </a:extLst>
+            </p:cNvPr>
+            <p:cNvSpPr txBox="1"/>
+            <p:nvPr/>
+          </p:nvSpPr>
+          <p:spPr>
+            <a:xfrm>
+              <a:off x="5803653" y="1043610"/>
+              <a:ext cx="1046612" cy="483426"/>
+            </a:xfrm>
+            <a:prstGeom prst="rect">
+              <a:avLst/>
+            </a:prstGeom>
+            <a:noFill/>
+          </p:spPr>
+          <p:txBody>
+            <a:bodyPr wrap="square" rtlCol="0">
+              <a:spAutoFit/>
+            </a:bodyPr>
+            <a:lstStyle/>
+            <a:p>
+              <a:r>
+                <a:rPr lang="zh-CN" altLang="en-US" sz="1400" dirty="0">
+                  <a:solidFill>
+                    <a:schemeClr val="bg2">
+                      <a:lumMod val="90000"/>
+                    </a:schemeClr>
+                  </a:solidFill>
+                </a:rPr>
+                <a:t>使用 </a:t>
+              </a:r>
+              <a:r>
+                <a:rPr lang="en-US" altLang="zh-CN" sz="1400" dirty="0">
+                  <a:solidFill>
+                    <a:schemeClr val="bg2">
+                      <a:lumMod val="90000"/>
+                    </a:schemeClr>
+                  </a:solidFill>
+                </a:rPr>
+                <a:t>Cglib </a:t>
+              </a:r>
+              <a:r>
+                <a:rPr lang="zh-CN" altLang="en-US" sz="1400" dirty="0">
+                  <a:solidFill>
+                    <a:schemeClr val="bg2">
+                      <a:lumMod val="90000"/>
+                    </a:schemeClr>
+                  </a:solidFill>
+                </a:rPr>
+                <a:t>实现实例化</a:t>
+              </a:r>
+            </a:p>
+          </p:txBody>
+        </p:sp>
+      </p:grpSp>
+      <p:grpSp>
+        <p:nvGrpSpPr>
+          <p:cNvPr id="28" name="组合 27">
+            <a:extLst>
+              <a:ext uri="{FF2B5EF4-FFF2-40B4-BE49-F238E27FC236}">
+                <a16:creationId xmlns:a16="http://schemas.microsoft.com/office/drawing/2014/main" id="{5D2F9A6F-65F3-47F9-9E64-41DC3DE9A3CF}"/>
+              </a:ext>
+            </a:extLst>
+          </p:cNvPr>
+          <p:cNvGrpSpPr/>
+          <p:nvPr/>
+        </p:nvGrpSpPr>
+        <p:grpSpPr>
+          <a:xfrm>
+            <a:off x="6233221" y="4981369"/>
+            <a:ext cx="4127439" cy="568199"/>
+            <a:chOff x="5812039" y="1043610"/>
+            <a:chExt cx="1413709" cy="892471"/>
+          </a:xfrm>
+        </p:grpSpPr>
+        <p:sp>
+          <p:nvSpPr>
+            <p:cNvPr id="29" name="矩形 28">
+              <a:extLst>
+                <a:ext uri="{FF2B5EF4-FFF2-40B4-BE49-F238E27FC236}">
+                  <a16:creationId xmlns:a16="http://schemas.microsoft.com/office/drawing/2014/main" id="{6922996E-C09F-4041-BB99-956E3B466711}"/>
+                </a:ext>
+              </a:extLst>
+            </p:cNvPr>
+            <p:cNvSpPr/>
+            <p:nvPr/>
+          </p:nvSpPr>
+          <p:spPr>
+            <a:xfrm>
+              <a:off x="5812039" y="1043610"/>
+              <a:ext cx="1413709" cy="892471"/>
+            </a:xfrm>
+            <a:prstGeom prst="rect">
+              <a:avLst/>
+            </a:prstGeom>
+            <a:noFill/>
+            <a:ln w="19050">
+              <a:solidFill>
+                <a:schemeClr val="tx1">
+                  <a:lumMod val="50000"/>
+                  <a:lumOff val="50000"/>
+                </a:schemeClr>
+              </a:solidFill>
+            </a:ln>
+          </p:spPr>
+          <p:style>
+            <a:lnRef idx="2">
+              <a:schemeClr val="accent1">
+                <a:shade val="50000"/>
+              </a:schemeClr>
+            </a:lnRef>
+            <a:fillRef idx="1">
+              <a:schemeClr val="accent1"/>
+            </a:fillRef>
+            <a:effectRef idx="0">
+              <a:schemeClr val="accent1"/>
+            </a:effectRef>
+            <a:fontRef idx="minor">
+              <a:schemeClr val="lt1"/>
+            </a:fontRef>
+          </p:style>
+          <p:txBody>
+            <a:bodyPr rtlCol="0" anchor="ctr"/>
+            <a:lstStyle/>
+            <a:p>
+              <a:pPr algn="ctr"/>
+              <a:endParaRPr lang="zh-CN" altLang="en-US"/>
+            </a:p>
+          </p:txBody>
+        </p:sp>
+        <p:sp>
+          <p:nvSpPr>
+            <p:cNvPr id="30" name="文本框 29">
+              <a:extLst>
+                <a:ext uri="{FF2B5EF4-FFF2-40B4-BE49-F238E27FC236}">
+                  <a16:creationId xmlns:a16="http://schemas.microsoft.com/office/drawing/2014/main" id="{F9C892F1-3912-413C-B751-5F93A449949E}"/>
+                </a:ext>
+              </a:extLst>
+            </p:cNvPr>
+            <p:cNvSpPr txBox="1"/>
+            <p:nvPr/>
+          </p:nvSpPr>
+          <p:spPr>
+            <a:xfrm>
+              <a:off x="6584247" y="1081707"/>
+              <a:ext cx="641501" cy="483426"/>
+            </a:xfrm>
+            <a:prstGeom prst="rect">
+              <a:avLst/>
+            </a:prstGeom>
+            <a:noFill/>
+          </p:spPr>
+          <p:txBody>
+            <a:bodyPr wrap="square" rtlCol="0">
+              <a:spAutoFit/>
+            </a:bodyPr>
+            <a:lstStyle/>
+            <a:p>
+              <a:r>
+                <a:rPr lang="zh-CN" altLang="en-US" sz="1400" dirty="0">
+                  <a:solidFill>
+                    <a:schemeClr val="bg2">
+                      <a:lumMod val="90000"/>
+                    </a:schemeClr>
+                  </a:solidFill>
+                </a:rPr>
+                <a:t>使用 </a:t>
+              </a:r>
+              <a:r>
+                <a:rPr lang="en-US" altLang="zh-CN" sz="1400" dirty="0">
+                  <a:solidFill>
+                    <a:schemeClr val="bg2">
+                      <a:lumMod val="90000"/>
+                    </a:schemeClr>
+                  </a:solidFill>
+                </a:rPr>
+                <a:t>JDK </a:t>
+              </a:r>
+              <a:r>
+                <a:rPr lang="zh-CN" altLang="en-US" sz="1400" dirty="0">
+                  <a:solidFill>
+                    <a:schemeClr val="bg2">
+                      <a:lumMod val="90000"/>
+                    </a:schemeClr>
+                  </a:solidFill>
+                </a:rPr>
+                <a:t>实现实例化</a:t>
+              </a:r>
+            </a:p>
+          </p:txBody>
+        </p:sp>
+      </p:grpSp>
+      <p:grpSp>
+        <p:nvGrpSpPr>
+          <p:cNvPr id="31" name="组合 30">
+            <a:extLst>
+              <a:ext uri="{FF2B5EF4-FFF2-40B4-BE49-F238E27FC236}">
+                <a16:creationId xmlns:a16="http://schemas.microsoft.com/office/drawing/2014/main" id="{F6788D8E-B6BF-47C8-9CE5-B6507AA4A302}"/>
+              </a:ext>
+            </a:extLst>
+          </p:cNvPr>
+          <p:cNvGrpSpPr/>
+          <p:nvPr/>
+        </p:nvGrpSpPr>
+        <p:grpSpPr>
+          <a:xfrm>
+            <a:off x="1431235" y="2158020"/>
+            <a:ext cx="5019261" cy="387471"/>
+            <a:chOff x="5803653" y="1043610"/>
+            <a:chExt cx="1675530" cy="892471"/>
+          </a:xfrm>
+        </p:grpSpPr>
+        <p:sp>
+          <p:nvSpPr>
+            <p:cNvPr id="32" name="矩形 31">
+              <a:extLst>
+                <a:ext uri="{FF2B5EF4-FFF2-40B4-BE49-F238E27FC236}">
+                  <a16:creationId xmlns:a16="http://schemas.microsoft.com/office/drawing/2014/main" id="{7DE9D998-69D0-4AD7-BCEA-4A9BA5DFA016}"/>
+                </a:ext>
+              </a:extLst>
+            </p:cNvPr>
+            <p:cNvSpPr/>
+            <p:nvPr/>
+          </p:nvSpPr>
+          <p:spPr>
+            <a:xfrm>
+              <a:off x="5812039" y="1043610"/>
+              <a:ext cx="1667144" cy="892471"/>
+            </a:xfrm>
+            <a:prstGeom prst="rect">
+              <a:avLst/>
+            </a:prstGeom>
+            <a:noFill/>
+            <a:ln w="19050">
+              <a:solidFill>
+                <a:schemeClr val="tx1">
+                  <a:lumMod val="50000"/>
+                  <a:lumOff val="50000"/>
+                </a:schemeClr>
+              </a:solidFill>
+            </a:ln>
+          </p:spPr>
+          <p:style>
+            <a:lnRef idx="2">
+              <a:schemeClr val="accent1">
+                <a:shade val="50000"/>
+              </a:schemeClr>
+            </a:lnRef>
+            <a:fillRef idx="1">
+              <a:schemeClr val="accent1"/>
+            </a:fillRef>
+            <a:effectRef idx="0">
+              <a:schemeClr val="accent1"/>
+            </a:effectRef>
+            <a:fontRef idx="minor">
+              <a:schemeClr val="lt1"/>
+            </a:fontRef>
+          </p:style>
+          <p:txBody>
+            <a:bodyPr rtlCol="0" anchor="ctr"/>
+            <a:lstStyle/>
+            <a:p>
+              <a:pPr algn="ctr"/>
+              <a:endParaRPr lang="zh-CN" altLang="en-US"/>
+            </a:p>
+          </p:txBody>
+        </p:sp>
+        <p:sp>
+          <p:nvSpPr>
+            <p:cNvPr id="33" name="文本框 32">
+              <a:extLst>
+                <a:ext uri="{FF2B5EF4-FFF2-40B4-BE49-F238E27FC236}">
+                  <a16:creationId xmlns:a16="http://schemas.microsoft.com/office/drawing/2014/main" id="{33089127-4041-4F70-9C20-FAD834B5E884}"/>
+                </a:ext>
+              </a:extLst>
+            </p:cNvPr>
+            <p:cNvSpPr txBox="1"/>
+            <p:nvPr/>
+          </p:nvSpPr>
+          <p:spPr>
+            <a:xfrm>
+              <a:off x="5803653" y="1043610"/>
+              <a:ext cx="897179" cy="708910"/>
+            </a:xfrm>
+            <a:prstGeom prst="rect">
+              <a:avLst/>
+            </a:prstGeom>
+            <a:noFill/>
+          </p:spPr>
+          <p:txBody>
+            <a:bodyPr wrap="none" rtlCol="0">
+              <a:spAutoFit/>
+            </a:bodyPr>
+            <a:lstStyle/>
+            <a:p>
+              <a:r>
+                <a:rPr lang="zh-CN" altLang="en-US" sz="1400" dirty="0">
+                  <a:solidFill>
+                    <a:schemeClr val="bg2">
+                      <a:lumMod val="90000"/>
+                    </a:schemeClr>
+                  </a:solidFill>
+                </a:rPr>
+                <a:t>实现了添加参数的 </a:t>
+              </a:r>
+              <a:r>
+                <a:rPr lang="en-US" altLang="zh-CN" sz="1400" dirty="0">
+                  <a:solidFill>
+                    <a:schemeClr val="bg2">
+                      <a:lumMod val="90000"/>
+                    </a:schemeClr>
+                  </a:solidFill>
+                </a:rPr>
+                <a:t>getBean </a:t>
+              </a:r>
+              <a:r>
+                <a:rPr lang="zh-CN" altLang="en-US" sz="1400" dirty="0">
+                  <a:solidFill>
+                    <a:schemeClr val="bg2">
+                      <a:lumMod val="90000"/>
+                    </a:schemeClr>
+                  </a:solidFill>
+                </a:rPr>
+                <a:t>方法</a:t>
+              </a:r>
+            </a:p>
+          </p:txBody>
+        </p:sp>
+      </p:grpSp>
     </p:spTree>
     <p:extLst>
       <p:ext uri="{BB962C8B-B14F-4D97-AF65-F5344CB8AC3E}">

</xml_diff>

<commit_message>
miniSpring05: - 实现从 xml 中读取 bean 配置
</commit_message>
<xml_diff>
--- a/miniSpring.pptx
+++ b/miniSpring.pptx
@@ -8,6 +8,8 @@
     <p:sldId id="256" r:id="rId2"/>
     <p:sldId id="257" r:id="rId3"/>
     <p:sldId id="258" r:id="rId4"/>
+    <p:sldId id="259" r:id="rId5"/>
+    <p:sldId id="260" r:id="rId6"/>
   </p:sldIdLst>
   <p:sldSz cx="12192000" cy="6858000"/>
   <p:notesSz cx="6858000" cy="9144000"/>
@@ -261,7 +263,7 @@
           <a:p>
             <a:fld id="{4CA57D55-CFD9-4D7E-B60B-1725E00699FD}" type="datetimeFigureOut">
               <a:rPr lang="zh-CN" altLang="en-US" smtClean="0"/>
-              <a:t>2021/9/14</a:t>
+              <a:t>2021/9/15</a:t>
             </a:fld>
             <a:endParaRPr lang="zh-CN" altLang="en-US"/>
           </a:p>
@@ -459,7 +461,7 @@
           <a:p>
             <a:fld id="{4CA57D55-CFD9-4D7E-B60B-1725E00699FD}" type="datetimeFigureOut">
               <a:rPr lang="zh-CN" altLang="en-US" smtClean="0"/>
-              <a:t>2021/9/14</a:t>
+              <a:t>2021/9/15</a:t>
             </a:fld>
             <a:endParaRPr lang="zh-CN" altLang="en-US"/>
           </a:p>
@@ -667,7 +669,7 @@
           <a:p>
             <a:fld id="{4CA57D55-CFD9-4D7E-B60B-1725E00699FD}" type="datetimeFigureOut">
               <a:rPr lang="zh-CN" altLang="en-US" smtClean="0"/>
-              <a:t>2021/9/14</a:t>
+              <a:t>2021/9/15</a:t>
             </a:fld>
             <a:endParaRPr lang="zh-CN" altLang="en-US"/>
           </a:p>
@@ -865,7 +867,7 @@
           <a:p>
             <a:fld id="{4CA57D55-CFD9-4D7E-B60B-1725E00699FD}" type="datetimeFigureOut">
               <a:rPr lang="zh-CN" altLang="en-US" smtClean="0"/>
-              <a:t>2021/9/14</a:t>
+              <a:t>2021/9/15</a:t>
             </a:fld>
             <a:endParaRPr lang="zh-CN" altLang="en-US"/>
           </a:p>
@@ -1140,7 +1142,7 @@
           <a:p>
             <a:fld id="{4CA57D55-CFD9-4D7E-B60B-1725E00699FD}" type="datetimeFigureOut">
               <a:rPr lang="zh-CN" altLang="en-US" smtClean="0"/>
-              <a:t>2021/9/14</a:t>
+              <a:t>2021/9/15</a:t>
             </a:fld>
             <a:endParaRPr lang="zh-CN" altLang="en-US"/>
           </a:p>
@@ -1405,7 +1407,7 @@
           <a:p>
             <a:fld id="{4CA57D55-CFD9-4D7E-B60B-1725E00699FD}" type="datetimeFigureOut">
               <a:rPr lang="zh-CN" altLang="en-US" smtClean="0"/>
-              <a:t>2021/9/14</a:t>
+              <a:t>2021/9/15</a:t>
             </a:fld>
             <a:endParaRPr lang="zh-CN" altLang="en-US"/>
           </a:p>
@@ -1817,7 +1819,7 @@
           <a:p>
             <a:fld id="{4CA57D55-CFD9-4D7E-B60B-1725E00699FD}" type="datetimeFigureOut">
               <a:rPr lang="zh-CN" altLang="en-US" smtClean="0"/>
-              <a:t>2021/9/14</a:t>
+              <a:t>2021/9/15</a:t>
             </a:fld>
             <a:endParaRPr lang="zh-CN" altLang="en-US"/>
           </a:p>
@@ -1958,7 +1960,7 @@
           <a:p>
             <a:fld id="{4CA57D55-CFD9-4D7E-B60B-1725E00699FD}" type="datetimeFigureOut">
               <a:rPr lang="zh-CN" altLang="en-US" smtClean="0"/>
-              <a:t>2021/9/14</a:t>
+              <a:t>2021/9/15</a:t>
             </a:fld>
             <a:endParaRPr lang="zh-CN" altLang="en-US"/>
           </a:p>
@@ -2071,7 +2073,7 @@
           <a:p>
             <a:fld id="{4CA57D55-CFD9-4D7E-B60B-1725E00699FD}" type="datetimeFigureOut">
               <a:rPr lang="zh-CN" altLang="en-US" smtClean="0"/>
-              <a:t>2021/9/14</a:t>
+              <a:t>2021/9/15</a:t>
             </a:fld>
             <a:endParaRPr lang="zh-CN" altLang="en-US"/>
           </a:p>
@@ -2382,7 +2384,7 @@
           <a:p>
             <a:fld id="{4CA57D55-CFD9-4D7E-B60B-1725E00699FD}" type="datetimeFigureOut">
               <a:rPr lang="zh-CN" altLang="en-US" smtClean="0"/>
-              <a:t>2021/9/14</a:t>
+              <a:t>2021/9/15</a:t>
             </a:fld>
             <a:endParaRPr lang="zh-CN" altLang="en-US"/>
           </a:p>
@@ -2670,7 +2672,7 @@
           <a:p>
             <a:fld id="{4CA57D55-CFD9-4D7E-B60B-1725E00699FD}" type="datetimeFigureOut">
               <a:rPr lang="zh-CN" altLang="en-US" smtClean="0"/>
-              <a:t>2021/9/14</a:t>
+              <a:t>2021/9/15</a:t>
             </a:fld>
             <a:endParaRPr lang="zh-CN" altLang="en-US"/>
           </a:p>
@@ -2911,7 +2913,7 @@
           <a:p>
             <a:fld id="{4CA57D55-CFD9-4D7E-B60B-1725E00699FD}" type="datetimeFigureOut">
               <a:rPr lang="zh-CN" altLang="en-US" smtClean="0"/>
-              <a:t>2021/9/14</a:t>
+              <a:t>2021/9/15</a:t>
             </a:fld>
             <a:endParaRPr lang="zh-CN" altLang="en-US"/>
           </a:p>
@@ -5749,6 +5751,941 @@
 </p:sld>
 </file>
 
+<file path=ppt/slides/slide4.xml><?xml version="1.0" encoding="utf-8"?>
+<p:sld xmlns:a="http://schemas.openxmlformats.org/drawingml/2006/main" xmlns:r="http://schemas.openxmlformats.org/officeDocument/2006/relationships" xmlns:p="http://schemas.openxmlformats.org/presentationml/2006/main">
+  <p:cSld>
+    <p:bg>
+      <p:bgPr>
+        <a:solidFill>
+          <a:srgbClr val="2B2B2B"/>
+        </a:solidFill>
+        <a:effectLst/>
+      </p:bgPr>
+    </p:bg>
+    <p:spTree>
+      <p:nvGrpSpPr>
+        <p:cNvPr id="1" name=""/>
+        <p:cNvGrpSpPr/>
+        <p:nvPr/>
+      </p:nvGrpSpPr>
+      <p:grpSpPr>
+        <a:xfrm>
+          <a:off x="0" y="0"/>
+          <a:ext cx="0" cy="0"/>
+          <a:chOff x="0" y="0"/>
+          <a:chExt cx="0" cy="0"/>
+        </a:xfrm>
+      </p:grpSpPr>
+      <p:pic>
+        <p:nvPicPr>
+          <p:cNvPr id="3" name="图片 2">
+            <a:extLst>
+              <a:ext uri="{FF2B5EF4-FFF2-40B4-BE49-F238E27FC236}">
+                <a16:creationId xmlns:a16="http://schemas.microsoft.com/office/drawing/2014/main" id="{4914D1ED-971F-40FF-BEDB-09539FE57108}"/>
+              </a:ext>
+            </a:extLst>
+          </p:cNvPr>
+          <p:cNvPicPr>
+            <a:picLocks noChangeAspect="1"/>
+          </p:cNvPicPr>
+          <p:nvPr/>
+        </p:nvPicPr>
+        <p:blipFill>
+          <a:blip r:embed="rId2"/>
+          <a:stretch>
+            <a:fillRect/>
+          </a:stretch>
+        </p:blipFill>
+        <p:spPr>
+          <a:xfrm>
+            <a:off x="1785140" y="-1"/>
+            <a:ext cx="8621720" cy="6858000"/>
+          </a:xfrm>
+          <a:prstGeom prst="rect">
+            <a:avLst/>
+          </a:prstGeom>
+        </p:spPr>
+      </p:pic>
+      <p:sp>
+        <p:nvSpPr>
+          <p:cNvPr id="35" name="矩形 34">
+            <a:extLst>
+              <a:ext uri="{FF2B5EF4-FFF2-40B4-BE49-F238E27FC236}">
+                <a16:creationId xmlns:a16="http://schemas.microsoft.com/office/drawing/2014/main" id="{20C47D44-B90B-48B5-BEAB-84D8F5C996C1}"/>
+              </a:ext>
+            </a:extLst>
+          </p:cNvPr>
+          <p:cNvSpPr/>
+          <p:nvPr/>
+        </p:nvSpPr>
+        <p:spPr>
+          <a:xfrm>
+            <a:off x="337931" y="3209549"/>
+            <a:ext cx="3458817" cy="1730199"/>
+          </a:xfrm>
+          <a:prstGeom prst="rect">
+            <a:avLst/>
+          </a:prstGeom>
+          <a:noFill/>
+          <a:ln w="19050">
+            <a:solidFill>
+              <a:srgbClr val="C00000"/>
+            </a:solidFill>
+          </a:ln>
+        </p:spPr>
+        <p:style>
+          <a:lnRef idx="2">
+            <a:schemeClr val="accent1">
+              <a:shade val="50000"/>
+            </a:schemeClr>
+          </a:lnRef>
+          <a:fillRef idx="1">
+            <a:schemeClr val="accent1"/>
+          </a:fillRef>
+          <a:effectRef idx="0">
+            <a:schemeClr val="accent1"/>
+          </a:effectRef>
+          <a:fontRef idx="minor">
+            <a:schemeClr val="lt1"/>
+          </a:fontRef>
+        </p:style>
+        <p:txBody>
+          <a:bodyPr rtlCol="0" anchor="ctr"/>
+          <a:lstStyle/>
+          <a:p>
+            <a:pPr algn="ctr"/>
+            <a:endParaRPr lang="zh-CN" altLang="en-US"/>
+          </a:p>
+        </p:txBody>
+      </p:sp>
+      <p:sp>
+        <p:nvSpPr>
+          <p:cNvPr id="37" name="矩形 36">
+            <a:extLst>
+              <a:ext uri="{FF2B5EF4-FFF2-40B4-BE49-F238E27FC236}">
+                <a16:creationId xmlns:a16="http://schemas.microsoft.com/office/drawing/2014/main" id="{4BA1466D-6353-4C05-AC00-31383BA74BFA}"/>
+              </a:ext>
+            </a:extLst>
+          </p:cNvPr>
+          <p:cNvSpPr/>
+          <p:nvPr/>
+        </p:nvSpPr>
+        <p:spPr>
+          <a:xfrm>
+            <a:off x="506896" y="1"/>
+            <a:ext cx="10768436" cy="3021496"/>
+          </a:xfrm>
+          <a:prstGeom prst="rect">
+            <a:avLst/>
+          </a:prstGeom>
+          <a:noFill/>
+          <a:ln w="19050">
+            <a:solidFill>
+              <a:srgbClr val="C00000"/>
+            </a:solidFill>
+          </a:ln>
+        </p:spPr>
+        <p:style>
+          <a:lnRef idx="2">
+            <a:schemeClr val="accent1">
+              <a:shade val="50000"/>
+            </a:schemeClr>
+          </a:lnRef>
+          <a:fillRef idx="1">
+            <a:schemeClr val="accent1"/>
+          </a:fillRef>
+          <a:effectRef idx="0">
+            <a:schemeClr val="accent1"/>
+          </a:effectRef>
+          <a:fontRef idx="minor">
+            <a:schemeClr val="lt1"/>
+          </a:fontRef>
+        </p:style>
+        <p:txBody>
+          <a:bodyPr rtlCol="0" anchor="ctr"/>
+          <a:lstStyle/>
+          <a:p>
+            <a:pPr algn="ctr"/>
+            <a:endParaRPr lang="zh-CN" altLang="en-US">
+              <a:solidFill>
+                <a:srgbClr val="C00000"/>
+              </a:solidFill>
+            </a:endParaRPr>
+          </a:p>
+        </p:txBody>
+      </p:sp>
+      <p:grpSp>
+        <p:nvGrpSpPr>
+          <p:cNvPr id="36" name="组合 35">
+            <a:extLst>
+              <a:ext uri="{FF2B5EF4-FFF2-40B4-BE49-F238E27FC236}">
+                <a16:creationId xmlns:a16="http://schemas.microsoft.com/office/drawing/2014/main" id="{92B27541-ECAB-4C8E-8B4C-1948200BEF8B}"/>
+              </a:ext>
+            </a:extLst>
+          </p:cNvPr>
+          <p:cNvGrpSpPr/>
+          <p:nvPr/>
+        </p:nvGrpSpPr>
+        <p:grpSpPr>
+          <a:xfrm>
+            <a:off x="218662" y="5010903"/>
+            <a:ext cx="5804452" cy="1143000"/>
+            <a:chOff x="5803653" y="1043610"/>
+            <a:chExt cx="1675530" cy="892471"/>
+          </a:xfrm>
+        </p:grpSpPr>
+        <p:sp>
+          <p:nvSpPr>
+            <p:cNvPr id="38" name="矩形 37">
+              <a:extLst>
+                <a:ext uri="{FF2B5EF4-FFF2-40B4-BE49-F238E27FC236}">
+                  <a16:creationId xmlns:a16="http://schemas.microsoft.com/office/drawing/2014/main" id="{02A0D4FD-17B7-4448-8BB7-DCF2C8DAE25B}"/>
+                </a:ext>
+              </a:extLst>
+            </p:cNvPr>
+            <p:cNvSpPr/>
+            <p:nvPr/>
+          </p:nvSpPr>
+          <p:spPr>
+            <a:xfrm>
+              <a:off x="5812039" y="1043610"/>
+              <a:ext cx="1667144" cy="892471"/>
+            </a:xfrm>
+            <a:prstGeom prst="rect">
+              <a:avLst/>
+            </a:prstGeom>
+            <a:noFill/>
+            <a:ln w="19050">
+              <a:solidFill>
+                <a:srgbClr val="C00000"/>
+              </a:solidFill>
+            </a:ln>
+          </p:spPr>
+          <p:style>
+            <a:lnRef idx="2">
+              <a:schemeClr val="accent1">
+                <a:shade val="50000"/>
+              </a:schemeClr>
+            </a:lnRef>
+            <a:fillRef idx="1">
+              <a:schemeClr val="accent1"/>
+            </a:fillRef>
+            <a:effectRef idx="0">
+              <a:schemeClr val="accent1"/>
+            </a:effectRef>
+            <a:fontRef idx="minor">
+              <a:schemeClr val="lt1"/>
+            </a:fontRef>
+          </p:style>
+          <p:txBody>
+            <a:bodyPr rtlCol="0" anchor="ctr"/>
+            <a:lstStyle/>
+            <a:p>
+              <a:pPr algn="ctr"/>
+              <a:endParaRPr lang="zh-CN" altLang="en-US"/>
+            </a:p>
+          </p:txBody>
+        </p:sp>
+        <p:sp>
+          <p:nvSpPr>
+            <p:cNvPr id="39" name="文本框 38">
+              <a:extLst>
+                <a:ext uri="{FF2B5EF4-FFF2-40B4-BE49-F238E27FC236}">
+                  <a16:creationId xmlns:a16="http://schemas.microsoft.com/office/drawing/2014/main" id="{4E838328-EB91-4DC1-BBEF-49C99675F322}"/>
+                </a:ext>
+              </a:extLst>
+            </p:cNvPr>
+            <p:cNvSpPr txBox="1"/>
+            <p:nvPr/>
+          </p:nvSpPr>
+          <p:spPr>
+            <a:xfrm>
+              <a:off x="5803653" y="1043610"/>
+              <a:ext cx="1675530" cy="240317"/>
+            </a:xfrm>
+            <a:prstGeom prst="rect">
+              <a:avLst/>
+            </a:prstGeom>
+            <a:noFill/>
+          </p:spPr>
+          <p:txBody>
+            <a:bodyPr wrap="square" rtlCol="0">
+              <a:spAutoFit/>
+            </a:bodyPr>
+            <a:lstStyle/>
+            <a:p>
+              <a:r>
+                <a:rPr lang="en-US" altLang="zh-CN" sz="1400" dirty="0">
+                  <a:solidFill>
+                    <a:schemeClr val="bg2">
+                      <a:lumMod val="90000"/>
+                    </a:schemeClr>
+                  </a:solidFill>
+                </a:rPr>
+                <a:t>Spring </a:t>
+              </a:r>
+              <a:r>
+                <a:rPr lang="zh-CN" altLang="en-US" sz="1400" dirty="0">
+                  <a:solidFill>
+                    <a:schemeClr val="bg2">
+                      <a:lumMod val="90000"/>
+                    </a:schemeClr>
+                  </a:solidFill>
+                </a:rPr>
+                <a:t>对资源的抽象</a:t>
+              </a:r>
+            </a:p>
+          </p:txBody>
+        </p:sp>
+      </p:grpSp>
+      <p:sp>
+        <p:nvSpPr>
+          <p:cNvPr id="16" name="矩形 15">
+            <a:extLst>
+              <a:ext uri="{FF2B5EF4-FFF2-40B4-BE49-F238E27FC236}">
+                <a16:creationId xmlns:a16="http://schemas.microsoft.com/office/drawing/2014/main" id="{7E88042E-7FF8-42B4-B56E-E27FBD4ABB28}"/>
+              </a:ext>
+            </a:extLst>
+          </p:cNvPr>
+          <p:cNvSpPr/>
+          <p:nvPr/>
+        </p:nvSpPr>
+        <p:spPr>
+          <a:xfrm>
+            <a:off x="3955775" y="3208758"/>
+            <a:ext cx="4899990" cy="1214155"/>
+          </a:xfrm>
+          <a:prstGeom prst="rect">
+            <a:avLst/>
+          </a:prstGeom>
+          <a:noFill/>
+          <a:ln w="19050">
+            <a:solidFill>
+              <a:srgbClr val="C00000"/>
+            </a:solidFill>
+          </a:ln>
+        </p:spPr>
+        <p:style>
+          <a:lnRef idx="2">
+            <a:schemeClr val="accent1">
+              <a:shade val="50000"/>
+            </a:schemeClr>
+          </a:lnRef>
+          <a:fillRef idx="1">
+            <a:schemeClr val="accent1"/>
+          </a:fillRef>
+          <a:effectRef idx="0">
+            <a:schemeClr val="accent1"/>
+          </a:effectRef>
+          <a:fontRef idx="minor">
+            <a:schemeClr val="lt1"/>
+          </a:fontRef>
+        </p:style>
+        <p:txBody>
+          <a:bodyPr rtlCol="0" anchor="ctr"/>
+          <a:lstStyle/>
+          <a:p>
+            <a:pPr algn="ctr"/>
+            <a:endParaRPr lang="zh-CN" altLang="en-US"/>
+          </a:p>
+        </p:txBody>
+      </p:sp>
+      <p:grpSp>
+        <p:nvGrpSpPr>
+          <p:cNvPr id="18" name="组合 17">
+            <a:extLst>
+              <a:ext uri="{FF2B5EF4-FFF2-40B4-BE49-F238E27FC236}">
+                <a16:creationId xmlns:a16="http://schemas.microsoft.com/office/drawing/2014/main" id="{5BFBF851-F10B-41C6-895B-FD03EED3E2B6}"/>
+              </a:ext>
+            </a:extLst>
+          </p:cNvPr>
+          <p:cNvGrpSpPr/>
+          <p:nvPr/>
+        </p:nvGrpSpPr>
+        <p:grpSpPr>
+          <a:xfrm>
+            <a:off x="1315146" y="2585409"/>
+            <a:ext cx="4191132" cy="391848"/>
+            <a:chOff x="5803653" y="1043610"/>
+            <a:chExt cx="1675530" cy="892471"/>
+          </a:xfrm>
+        </p:grpSpPr>
+        <p:sp>
+          <p:nvSpPr>
+            <p:cNvPr id="19" name="矩形 18">
+              <a:extLst>
+                <a:ext uri="{FF2B5EF4-FFF2-40B4-BE49-F238E27FC236}">
+                  <a16:creationId xmlns:a16="http://schemas.microsoft.com/office/drawing/2014/main" id="{85D9CED9-5FA8-4517-9F98-91D8E5FF44D2}"/>
+                </a:ext>
+              </a:extLst>
+            </p:cNvPr>
+            <p:cNvSpPr/>
+            <p:nvPr/>
+          </p:nvSpPr>
+          <p:spPr>
+            <a:xfrm>
+              <a:off x="5812039" y="1043610"/>
+              <a:ext cx="1667144" cy="892471"/>
+            </a:xfrm>
+            <a:prstGeom prst="rect">
+              <a:avLst/>
+            </a:prstGeom>
+            <a:noFill/>
+            <a:ln w="19050">
+              <a:solidFill>
+                <a:schemeClr val="tx1">
+                  <a:lumMod val="50000"/>
+                  <a:lumOff val="50000"/>
+                </a:schemeClr>
+              </a:solidFill>
+            </a:ln>
+          </p:spPr>
+          <p:style>
+            <a:lnRef idx="2">
+              <a:schemeClr val="accent1">
+                <a:shade val="50000"/>
+              </a:schemeClr>
+            </a:lnRef>
+            <a:fillRef idx="1">
+              <a:schemeClr val="accent1"/>
+            </a:fillRef>
+            <a:effectRef idx="0">
+              <a:schemeClr val="accent1"/>
+            </a:effectRef>
+            <a:fontRef idx="minor">
+              <a:schemeClr val="lt1"/>
+            </a:fontRef>
+          </p:style>
+          <p:txBody>
+            <a:bodyPr rtlCol="0" anchor="ctr"/>
+            <a:lstStyle/>
+            <a:p>
+              <a:pPr algn="ctr"/>
+              <a:endParaRPr lang="zh-CN" altLang="en-US"/>
+            </a:p>
+          </p:txBody>
+        </p:sp>
+        <p:sp>
+          <p:nvSpPr>
+            <p:cNvPr id="20" name="文本框 19">
+              <a:extLst>
+                <a:ext uri="{FF2B5EF4-FFF2-40B4-BE49-F238E27FC236}">
+                  <a16:creationId xmlns:a16="http://schemas.microsoft.com/office/drawing/2014/main" id="{4F0ED440-4F90-469F-B38B-5B3A2D02FE36}"/>
+                </a:ext>
+              </a:extLst>
+            </p:cNvPr>
+            <p:cNvSpPr txBox="1"/>
+            <p:nvPr/>
+          </p:nvSpPr>
+          <p:spPr>
+            <a:xfrm>
+              <a:off x="5803653" y="1043610"/>
+              <a:ext cx="1675530" cy="700991"/>
+            </a:xfrm>
+            <a:prstGeom prst="rect">
+              <a:avLst/>
+            </a:prstGeom>
+            <a:noFill/>
+          </p:spPr>
+          <p:txBody>
+            <a:bodyPr wrap="square" rtlCol="0">
+              <a:spAutoFit/>
+            </a:bodyPr>
+            <a:lstStyle/>
+            <a:p>
+              <a:r>
+                <a:rPr lang="zh-CN" altLang="en-US" sz="1400" dirty="0">
+                  <a:solidFill>
+                    <a:schemeClr val="bg2">
+                      <a:lumMod val="90000"/>
+                    </a:schemeClr>
+                  </a:solidFill>
+                </a:rPr>
+                <a:t>增加按指定类型返回 </a:t>
+              </a:r>
+              <a:r>
+                <a:rPr lang="en-US" altLang="zh-CN" sz="1400" dirty="0">
+                  <a:solidFill>
+                    <a:schemeClr val="bg2">
+                      <a:lumMod val="90000"/>
+                    </a:schemeClr>
+                  </a:solidFill>
+                </a:rPr>
+                <a:t>bean</a:t>
+              </a:r>
+              <a:endParaRPr lang="zh-CN" altLang="en-US" sz="1400" dirty="0">
+                <a:solidFill>
+                  <a:schemeClr val="bg2">
+                    <a:lumMod val="90000"/>
+                  </a:schemeClr>
+                </a:solidFill>
+              </a:endParaRPr>
+            </a:p>
+          </p:txBody>
+        </p:sp>
+      </p:grpSp>
+      <p:sp>
+        <p:nvSpPr>
+          <p:cNvPr id="21" name="矩形 20">
+            <a:extLst>
+              <a:ext uri="{FF2B5EF4-FFF2-40B4-BE49-F238E27FC236}">
+                <a16:creationId xmlns:a16="http://schemas.microsoft.com/office/drawing/2014/main" id="{4D7D8E58-9153-4F85-AB72-71AB5DAC5376}"/>
+              </a:ext>
+            </a:extLst>
+          </p:cNvPr>
+          <p:cNvSpPr/>
+          <p:nvPr/>
+        </p:nvSpPr>
+        <p:spPr>
+          <a:xfrm>
+            <a:off x="6168888" y="4939749"/>
+            <a:ext cx="1881808" cy="1249732"/>
+          </a:xfrm>
+          <a:prstGeom prst="rect">
+            <a:avLst/>
+          </a:prstGeom>
+          <a:noFill/>
+          <a:ln w="19050">
+            <a:solidFill>
+              <a:srgbClr val="C00000"/>
+            </a:solidFill>
+          </a:ln>
+        </p:spPr>
+        <p:style>
+          <a:lnRef idx="2">
+            <a:schemeClr val="accent1">
+              <a:shade val="50000"/>
+            </a:schemeClr>
+          </a:lnRef>
+          <a:fillRef idx="1">
+            <a:schemeClr val="accent1"/>
+          </a:fillRef>
+          <a:effectRef idx="0">
+            <a:schemeClr val="accent1"/>
+          </a:effectRef>
+          <a:fontRef idx="minor">
+            <a:schemeClr val="lt1"/>
+          </a:fontRef>
+        </p:style>
+        <p:txBody>
+          <a:bodyPr rtlCol="0" anchor="ctr"/>
+          <a:lstStyle/>
+          <a:p>
+            <a:pPr algn="ctr"/>
+            <a:endParaRPr lang="zh-CN" altLang="en-US"/>
+          </a:p>
+        </p:txBody>
+      </p:sp>
+      <p:grpSp>
+        <p:nvGrpSpPr>
+          <p:cNvPr id="22" name="组合 21">
+            <a:extLst>
+              <a:ext uri="{FF2B5EF4-FFF2-40B4-BE49-F238E27FC236}">
+                <a16:creationId xmlns:a16="http://schemas.microsoft.com/office/drawing/2014/main" id="{E0795E96-98D3-4788-99B1-F114A609F096}"/>
+              </a:ext>
+            </a:extLst>
+          </p:cNvPr>
+          <p:cNvGrpSpPr/>
+          <p:nvPr/>
+        </p:nvGrpSpPr>
+        <p:grpSpPr>
+          <a:xfrm>
+            <a:off x="6196497" y="5655365"/>
+            <a:ext cx="7370415" cy="498538"/>
+            <a:chOff x="5812039" y="1043610"/>
+            <a:chExt cx="2238736" cy="892471"/>
+          </a:xfrm>
+        </p:grpSpPr>
+        <p:sp>
+          <p:nvSpPr>
+            <p:cNvPr id="23" name="矩形 22">
+              <a:extLst>
+                <a:ext uri="{FF2B5EF4-FFF2-40B4-BE49-F238E27FC236}">
+                  <a16:creationId xmlns:a16="http://schemas.microsoft.com/office/drawing/2014/main" id="{4BD1377C-81A6-4129-B6D4-9BAEF65D8AAC}"/>
+                </a:ext>
+              </a:extLst>
+            </p:cNvPr>
+            <p:cNvSpPr/>
+            <p:nvPr/>
+          </p:nvSpPr>
+          <p:spPr>
+            <a:xfrm>
+              <a:off x="5812039" y="1043610"/>
+              <a:ext cx="1667144" cy="892471"/>
+            </a:xfrm>
+            <a:prstGeom prst="rect">
+              <a:avLst/>
+            </a:prstGeom>
+            <a:noFill/>
+            <a:ln w="19050">
+              <a:solidFill>
+                <a:schemeClr val="tx1">
+                  <a:lumMod val="50000"/>
+                  <a:lumOff val="50000"/>
+                </a:schemeClr>
+              </a:solidFill>
+            </a:ln>
+          </p:spPr>
+          <p:style>
+            <a:lnRef idx="2">
+              <a:schemeClr val="accent1">
+                <a:shade val="50000"/>
+              </a:schemeClr>
+            </a:lnRef>
+            <a:fillRef idx="1">
+              <a:schemeClr val="accent1"/>
+            </a:fillRef>
+            <a:effectRef idx="0">
+              <a:schemeClr val="accent1"/>
+            </a:effectRef>
+            <a:fontRef idx="minor">
+              <a:schemeClr val="lt1"/>
+            </a:fontRef>
+          </p:style>
+          <p:txBody>
+            <a:bodyPr rtlCol="0" anchor="ctr"/>
+            <a:lstStyle/>
+            <a:p>
+              <a:pPr algn="ctr"/>
+              <a:endParaRPr lang="zh-CN" altLang="en-US"/>
+            </a:p>
+          </p:txBody>
+        </p:sp>
+        <p:sp>
+          <p:nvSpPr>
+            <p:cNvPr id="24" name="文本框 23">
+              <a:extLst>
+                <a:ext uri="{FF2B5EF4-FFF2-40B4-BE49-F238E27FC236}">
+                  <a16:creationId xmlns:a16="http://schemas.microsoft.com/office/drawing/2014/main" id="{0E66CE00-1448-43FC-A213-909C7713C98D}"/>
+                </a:ext>
+              </a:extLst>
+            </p:cNvPr>
+            <p:cNvSpPr txBox="1"/>
+            <p:nvPr/>
+          </p:nvSpPr>
+          <p:spPr>
+            <a:xfrm>
+              <a:off x="6375245" y="1139350"/>
+              <a:ext cx="1675530" cy="550975"/>
+            </a:xfrm>
+            <a:prstGeom prst="rect">
+              <a:avLst/>
+            </a:prstGeom>
+            <a:noFill/>
+          </p:spPr>
+          <p:txBody>
+            <a:bodyPr wrap="square" rtlCol="0">
+              <a:spAutoFit/>
+            </a:bodyPr>
+            <a:lstStyle/>
+            <a:p>
+              <a:r>
+                <a:rPr lang="zh-CN" altLang="en-US" sz="1400" dirty="0">
+                  <a:solidFill>
+                    <a:schemeClr val="bg2">
+                      <a:lumMod val="90000"/>
+                    </a:schemeClr>
+                  </a:solidFill>
+                </a:rPr>
+                <a:t>资源加载器，会选择适用的资源加载方式</a:t>
+              </a:r>
+            </a:p>
+          </p:txBody>
+        </p:sp>
+      </p:grpSp>
+      <p:cxnSp>
+        <p:nvCxnSpPr>
+          <p:cNvPr id="25" name="直接箭头连接符 24">
+            <a:extLst>
+              <a:ext uri="{FF2B5EF4-FFF2-40B4-BE49-F238E27FC236}">
+                <a16:creationId xmlns:a16="http://schemas.microsoft.com/office/drawing/2014/main" id="{94083B12-CA41-4E95-AD4C-F9F62301B086}"/>
+              </a:ext>
+            </a:extLst>
+          </p:cNvPr>
+          <p:cNvCxnSpPr>
+            <a:cxnSpLocks/>
+            <a:stCxn id="39" idx="0"/>
+          </p:cNvCxnSpPr>
+          <p:nvPr/>
+        </p:nvCxnSpPr>
+        <p:spPr>
+          <a:xfrm flipV="1">
+            <a:off x="3120888" y="4840357"/>
+            <a:ext cx="0" cy="170546"/>
+          </a:xfrm>
+          <a:prstGeom prst="straightConnector1">
+            <a:avLst/>
+          </a:prstGeom>
+          <a:ln>
+            <a:solidFill>
+              <a:schemeClr val="bg1">
+                <a:lumMod val="65000"/>
+              </a:schemeClr>
+            </a:solidFill>
+            <a:tailEnd type="triangle"/>
+          </a:ln>
+        </p:spPr>
+        <p:style>
+          <a:lnRef idx="3">
+            <a:schemeClr val="dk1"/>
+          </a:lnRef>
+          <a:fillRef idx="0">
+            <a:schemeClr val="dk1"/>
+          </a:fillRef>
+          <a:effectRef idx="2">
+            <a:schemeClr val="dk1"/>
+          </a:effectRef>
+          <a:fontRef idx="minor">
+            <a:schemeClr val="tx1"/>
+          </a:fontRef>
+        </p:style>
+      </p:cxnSp>
+      <p:cxnSp>
+        <p:nvCxnSpPr>
+          <p:cNvPr id="28" name="连接符: 肘形 27">
+            <a:extLst>
+              <a:ext uri="{FF2B5EF4-FFF2-40B4-BE49-F238E27FC236}">
+                <a16:creationId xmlns:a16="http://schemas.microsoft.com/office/drawing/2014/main" id="{9267004A-C0CE-42F5-B5D7-2D3924DF2941}"/>
+              </a:ext>
+            </a:extLst>
+          </p:cNvPr>
+          <p:cNvCxnSpPr>
+            <a:stCxn id="21" idx="0"/>
+          </p:cNvCxnSpPr>
+          <p:nvPr/>
+        </p:nvCxnSpPr>
+        <p:spPr>
+          <a:xfrm rot="16200000" flipV="1">
+            <a:off x="5299213" y="3129170"/>
+            <a:ext cx="308114" cy="3313044"/>
+          </a:xfrm>
+          <a:prstGeom prst="bentConnector2">
+            <a:avLst/>
+          </a:prstGeom>
+          <a:ln>
+            <a:solidFill>
+              <a:srgbClr val="8F8F8F"/>
+            </a:solidFill>
+            <a:tailEnd type="triangle"/>
+          </a:ln>
+        </p:spPr>
+        <p:style>
+          <a:lnRef idx="1">
+            <a:schemeClr val="accent1"/>
+          </a:lnRef>
+          <a:fillRef idx="0">
+            <a:schemeClr val="accent1"/>
+          </a:fillRef>
+          <a:effectRef idx="0">
+            <a:schemeClr val="accent1"/>
+          </a:effectRef>
+          <a:fontRef idx="minor">
+            <a:schemeClr val="tx1"/>
+          </a:fontRef>
+        </p:style>
+      </p:cxnSp>
+      <p:sp>
+        <p:nvSpPr>
+          <p:cNvPr id="30" name="文本框 29">
+            <a:extLst>
+              <a:ext uri="{FF2B5EF4-FFF2-40B4-BE49-F238E27FC236}">
+                <a16:creationId xmlns:a16="http://schemas.microsoft.com/office/drawing/2014/main" id="{E0282077-E4A7-41CB-AD93-8AFB5E394C83}"/>
+              </a:ext>
+            </a:extLst>
+          </p:cNvPr>
+          <p:cNvSpPr txBox="1"/>
+          <p:nvPr/>
+        </p:nvSpPr>
+        <p:spPr>
+          <a:xfrm>
+            <a:off x="337931" y="3228013"/>
+            <a:ext cx="1447209" cy="1169551"/>
+          </a:xfrm>
+          <a:prstGeom prst="rect">
+            <a:avLst/>
+          </a:prstGeom>
+          <a:noFill/>
+        </p:spPr>
+        <p:txBody>
+          <a:bodyPr wrap="square" rtlCol="0">
+            <a:spAutoFit/>
+          </a:bodyPr>
+          <a:lstStyle/>
+          <a:p>
+            <a:r>
+              <a:rPr lang="zh-CN" altLang="en-US" sz="1400" dirty="0">
+                <a:solidFill>
+                  <a:schemeClr val="bg2">
+                    <a:lumMod val="90000"/>
+                  </a:schemeClr>
+                </a:solidFill>
+              </a:rPr>
+              <a:t>链接</a:t>
+            </a:r>
+            <a:r>
+              <a:rPr lang="en-US" altLang="zh-CN" sz="1400" dirty="0">
+                <a:solidFill>
+                  <a:schemeClr val="bg2">
+                    <a:lumMod val="90000"/>
+                  </a:schemeClr>
+                </a:solidFill>
+              </a:rPr>
+              <a:t> Loader </a:t>
+            </a:r>
+            <a:r>
+              <a:rPr lang="zh-CN" altLang="en-US" sz="1400" dirty="0">
+                <a:solidFill>
+                  <a:schemeClr val="bg2">
+                    <a:lumMod val="90000"/>
+                  </a:schemeClr>
+                </a:solidFill>
+              </a:rPr>
+              <a:t>和 </a:t>
+            </a:r>
+            <a:r>
+              <a:rPr lang="en-US" altLang="zh-CN" sz="1400" dirty="0">
+                <a:solidFill>
+                  <a:schemeClr val="bg2">
+                    <a:lumMod val="90000"/>
+                  </a:schemeClr>
+                </a:solidFill>
+              </a:rPr>
+              <a:t>Register</a:t>
+            </a:r>
+            <a:r>
+              <a:rPr lang="zh-CN" altLang="en-US" sz="1400" dirty="0">
+                <a:solidFill>
+                  <a:schemeClr val="bg2">
+                    <a:lumMod val="90000"/>
+                  </a:schemeClr>
+                </a:solidFill>
+              </a:rPr>
+              <a:t>，将 </a:t>
+            </a:r>
+            <a:r>
+              <a:rPr lang="en-US" altLang="zh-CN" sz="1400" dirty="0">
+                <a:solidFill>
+                  <a:schemeClr val="bg2">
+                    <a:lumMod val="90000"/>
+                  </a:schemeClr>
+                </a:solidFill>
+              </a:rPr>
+              <a:t>XML </a:t>
+            </a:r>
+            <a:r>
+              <a:rPr lang="zh-CN" altLang="en-US" sz="1400" dirty="0">
+                <a:solidFill>
+                  <a:schemeClr val="bg2">
+                    <a:lumMod val="90000"/>
+                  </a:schemeClr>
+                </a:solidFill>
+              </a:rPr>
+              <a:t>中读取的 </a:t>
+            </a:r>
+            <a:r>
+              <a:rPr lang="en-US" altLang="zh-CN" sz="1400" dirty="0">
+                <a:solidFill>
+                  <a:schemeClr val="bg2">
+                    <a:lumMod val="90000"/>
+                  </a:schemeClr>
+                </a:solidFill>
+              </a:rPr>
+              <a:t>bean </a:t>
+            </a:r>
+            <a:r>
+              <a:rPr lang="zh-CN" altLang="en-US" sz="1400" dirty="0">
+                <a:solidFill>
+                  <a:schemeClr val="bg2">
+                    <a:lumMod val="90000"/>
+                  </a:schemeClr>
+                </a:solidFill>
+              </a:rPr>
+              <a:t>组装并进行注册</a:t>
+            </a:r>
+          </a:p>
+        </p:txBody>
+      </p:sp>
+    </p:spTree>
+    <p:extLst>
+      <p:ext uri="{BB962C8B-B14F-4D97-AF65-F5344CB8AC3E}">
+        <p14:creationId xmlns:p14="http://schemas.microsoft.com/office/powerpoint/2010/main" val="2328166610"/>
+      </p:ext>
+    </p:extLst>
+  </p:cSld>
+  <p:clrMapOvr>
+    <a:masterClrMapping/>
+  </p:clrMapOvr>
+</p:sld>
+</file>
+
+<file path=ppt/slides/slide5.xml><?xml version="1.0" encoding="utf-8"?>
+<p:sld xmlns:a="http://schemas.openxmlformats.org/drawingml/2006/main" xmlns:r="http://schemas.openxmlformats.org/officeDocument/2006/relationships" xmlns:p="http://schemas.openxmlformats.org/presentationml/2006/main">
+  <p:cSld>
+    <p:bg>
+      <p:bgPr>
+        <a:solidFill>
+          <a:srgbClr val="2B2B2B"/>
+        </a:solidFill>
+        <a:effectLst/>
+      </p:bgPr>
+    </p:bg>
+    <p:spTree>
+      <p:nvGrpSpPr>
+        <p:cNvPr id="1" name=""/>
+        <p:cNvGrpSpPr/>
+        <p:nvPr/>
+      </p:nvGrpSpPr>
+      <p:grpSpPr>
+        <a:xfrm>
+          <a:off x="0" y="0"/>
+          <a:ext cx="0" cy="0"/>
+          <a:chOff x="0" y="0"/>
+          <a:chExt cx="0" cy="0"/>
+        </a:xfrm>
+      </p:grpSpPr>
+      <p:pic>
+        <p:nvPicPr>
+          <p:cNvPr id="5" name="图片 4">
+            <a:extLst>
+              <a:ext uri="{FF2B5EF4-FFF2-40B4-BE49-F238E27FC236}">
+                <a16:creationId xmlns:a16="http://schemas.microsoft.com/office/drawing/2014/main" id="{ED1D2C0D-44D2-4848-9B3A-0885E80C248F}"/>
+              </a:ext>
+            </a:extLst>
+          </p:cNvPr>
+          <p:cNvPicPr>
+            <a:picLocks noChangeAspect="1"/>
+          </p:cNvPicPr>
+          <p:nvPr/>
+        </p:nvPicPr>
+        <p:blipFill>
+          <a:blip r:embed="rId2"/>
+          <a:stretch>
+            <a:fillRect/>
+          </a:stretch>
+        </p:blipFill>
+        <p:spPr>
+          <a:xfrm>
+            <a:off x="1517505" y="0"/>
+            <a:ext cx="9156989" cy="6858000"/>
+          </a:xfrm>
+          <a:prstGeom prst="rect">
+            <a:avLst/>
+          </a:prstGeom>
+        </p:spPr>
+      </p:pic>
+    </p:spTree>
+    <p:extLst>
+      <p:ext uri="{BB962C8B-B14F-4D97-AF65-F5344CB8AC3E}">
+        <p14:creationId xmlns:p14="http://schemas.microsoft.com/office/powerpoint/2010/main" val="4015689935"/>
+      </p:ext>
+    </p:extLst>
+  </p:cSld>
+  <p:clrMapOvr>
+    <a:masterClrMapping/>
+  </p:clrMapOvr>
+</p:sld>
+</file>
+
 <file path=ppt/theme/theme1.xml><?xml version="1.0" encoding="utf-8"?>
 <a:theme xmlns:a="http://schemas.openxmlformats.org/drawingml/2006/main" name="Office 主题​​">
   <a:themeElements>

</xml_diff>

<commit_message>
miniSpring06: - 实现 spring 上下文，并通过 postProcessor 进行自定义操作
</commit_message>
<xml_diff>
--- a/miniSpring.pptx
+++ b/miniSpring.pptx
@@ -6673,6 +6673,1423 @@
           </a:prstGeom>
         </p:spPr>
       </p:pic>
+      <p:grpSp>
+        <p:nvGrpSpPr>
+          <p:cNvPr id="6" name="组合 5">
+            <a:extLst>
+              <a:ext uri="{FF2B5EF4-FFF2-40B4-BE49-F238E27FC236}">
+                <a16:creationId xmlns:a16="http://schemas.microsoft.com/office/drawing/2014/main" id="{5C2848CA-F69F-4A54-A7CA-DDCAE0CB0287}"/>
+              </a:ext>
+            </a:extLst>
+          </p:cNvPr>
+          <p:cNvGrpSpPr/>
+          <p:nvPr/>
+        </p:nvGrpSpPr>
+        <p:grpSpPr>
+          <a:xfrm>
+            <a:off x="5181600" y="1286935"/>
+            <a:ext cx="1524000" cy="482599"/>
+            <a:chOff x="5812039" y="1043610"/>
+            <a:chExt cx="1667144" cy="892471"/>
+          </a:xfrm>
+        </p:grpSpPr>
+        <p:sp>
+          <p:nvSpPr>
+            <p:cNvPr id="7" name="矩形 6">
+              <a:extLst>
+                <a:ext uri="{FF2B5EF4-FFF2-40B4-BE49-F238E27FC236}">
+                  <a16:creationId xmlns:a16="http://schemas.microsoft.com/office/drawing/2014/main" id="{F2B2B3F2-2522-44C1-9CB2-184903548925}"/>
+                </a:ext>
+              </a:extLst>
+            </p:cNvPr>
+            <p:cNvSpPr/>
+            <p:nvPr/>
+          </p:nvSpPr>
+          <p:spPr>
+            <a:xfrm>
+              <a:off x="5812039" y="1043610"/>
+              <a:ext cx="1667144" cy="892471"/>
+            </a:xfrm>
+            <a:prstGeom prst="rect">
+              <a:avLst/>
+            </a:prstGeom>
+            <a:noFill/>
+            <a:ln w="19050">
+              <a:solidFill>
+                <a:schemeClr val="tx1">
+                  <a:lumMod val="50000"/>
+                  <a:lumOff val="50000"/>
+                </a:schemeClr>
+              </a:solidFill>
+            </a:ln>
+          </p:spPr>
+          <p:style>
+            <a:lnRef idx="2">
+              <a:schemeClr val="accent1">
+                <a:shade val="50000"/>
+              </a:schemeClr>
+            </a:lnRef>
+            <a:fillRef idx="1">
+              <a:schemeClr val="accent1"/>
+            </a:fillRef>
+            <a:effectRef idx="0">
+              <a:schemeClr val="accent1"/>
+            </a:effectRef>
+            <a:fontRef idx="minor">
+              <a:schemeClr val="lt1"/>
+            </a:fontRef>
+          </p:style>
+          <p:txBody>
+            <a:bodyPr rtlCol="0" anchor="ctr"/>
+            <a:lstStyle/>
+            <a:p>
+              <a:pPr algn="ctr"/>
+              <a:endParaRPr lang="zh-CN" altLang="en-US"/>
+            </a:p>
+          </p:txBody>
+        </p:sp>
+        <p:sp>
+          <p:nvSpPr>
+            <p:cNvPr id="8" name="文本框 7">
+              <a:extLst>
+                <a:ext uri="{FF2B5EF4-FFF2-40B4-BE49-F238E27FC236}">
+                  <a16:creationId xmlns:a16="http://schemas.microsoft.com/office/drawing/2014/main" id="{5568419B-6198-4325-B8E5-354AE148AD47}"/>
+                </a:ext>
+              </a:extLst>
+            </p:cNvPr>
+            <p:cNvSpPr txBox="1"/>
+            <p:nvPr/>
+          </p:nvSpPr>
+          <p:spPr>
+            <a:xfrm>
+              <a:off x="5812039" y="1084309"/>
+              <a:ext cx="1667144" cy="376146"/>
+            </a:xfrm>
+            <a:prstGeom prst="rect">
+              <a:avLst/>
+            </a:prstGeom>
+            <a:noFill/>
+            <a:ln w="9525">
+              <a:noFill/>
+            </a:ln>
+          </p:spPr>
+          <p:txBody>
+            <a:bodyPr wrap="square" rtlCol="0">
+              <a:spAutoFit/>
+            </a:bodyPr>
+            <a:lstStyle/>
+            <a:p>
+              <a:r>
+                <a:rPr lang="zh-CN" altLang="en-US" sz="1000" dirty="0">
+                  <a:solidFill>
+                    <a:schemeClr val="bg2">
+                      <a:lumMod val="90000"/>
+                    </a:schemeClr>
+                  </a:solidFill>
+                </a:rPr>
+                <a:t>接入上下文操作</a:t>
+              </a:r>
+            </a:p>
+          </p:txBody>
+        </p:sp>
+      </p:grpSp>
+      <p:grpSp>
+        <p:nvGrpSpPr>
+          <p:cNvPr id="9" name="组合 8">
+            <a:extLst>
+              <a:ext uri="{FF2B5EF4-FFF2-40B4-BE49-F238E27FC236}">
+                <a16:creationId xmlns:a16="http://schemas.microsoft.com/office/drawing/2014/main" id="{DA46A178-99DF-4CFA-95C5-CA1B60C36788}"/>
+              </a:ext>
+            </a:extLst>
+          </p:cNvPr>
+          <p:cNvGrpSpPr/>
+          <p:nvPr/>
+        </p:nvGrpSpPr>
+        <p:grpSpPr>
+          <a:xfrm>
+            <a:off x="6798733" y="804338"/>
+            <a:ext cx="2336800" cy="482598"/>
+            <a:chOff x="5812039" y="1043610"/>
+            <a:chExt cx="1667144" cy="892471"/>
+          </a:xfrm>
+        </p:grpSpPr>
+        <p:sp>
+          <p:nvSpPr>
+            <p:cNvPr id="10" name="矩形 9">
+              <a:extLst>
+                <a:ext uri="{FF2B5EF4-FFF2-40B4-BE49-F238E27FC236}">
+                  <a16:creationId xmlns:a16="http://schemas.microsoft.com/office/drawing/2014/main" id="{82FA6C1F-A17D-4787-856C-7027F11279E7}"/>
+                </a:ext>
+              </a:extLst>
+            </p:cNvPr>
+            <p:cNvSpPr/>
+            <p:nvPr/>
+          </p:nvSpPr>
+          <p:spPr>
+            <a:xfrm>
+              <a:off x="5812039" y="1043610"/>
+              <a:ext cx="1667144" cy="892471"/>
+            </a:xfrm>
+            <a:prstGeom prst="rect">
+              <a:avLst/>
+            </a:prstGeom>
+            <a:noFill/>
+            <a:ln w="19050">
+              <a:solidFill>
+                <a:schemeClr val="tx1">
+                  <a:lumMod val="50000"/>
+                  <a:lumOff val="50000"/>
+                </a:schemeClr>
+              </a:solidFill>
+            </a:ln>
+          </p:spPr>
+          <p:style>
+            <a:lnRef idx="2">
+              <a:schemeClr val="accent1">
+                <a:shade val="50000"/>
+              </a:schemeClr>
+            </a:lnRef>
+            <a:fillRef idx="1">
+              <a:schemeClr val="accent1"/>
+            </a:fillRef>
+            <a:effectRef idx="0">
+              <a:schemeClr val="accent1"/>
+            </a:effectRef>
+            <a:fontRef idx="minor">
+              <a:schemeClr val="lt1"/>
+            </a:fontRef>
+          </p:style>
+          <p:txBody>
+            <a:bodyPr rtlCol="0" anchor="ctr"/>
+            <a:lstStyle/>
+            <a:p>
+              <a:pPr algn="ctr"/>
+              <a:endParaRPr lang="zh-CN" altLang="en-US"/>
+            </a:p>
+          </p:txBody>
+        </p:sp>
+        <p:sp>
+          <p:nvSpPr>
+            <p:cNvPr id="11" name="文本框 10">
+              <a:extLst>
+                <a:ext uri="{FF2B5EF4-FFF2-40B4-BE49-F238E27FC236}">
+                  <a16:creationId xmlns:a16="http://schemas.microsoft.com/office/drawing/2014/main" id="{6538A07D-F512-4461-9521-E13EC619E55F}"/>
+                </a:ext>
+              </a:extLst>
+            </p:cNvPr>
+            <p:cNvSpPr txBox="1"/>
+            <p:nvPr/>
+          </p:nvSpPr>
+          <p:spPr>
+            <a:xfrm>
+              <a:off x="5812039" y="1084308"/>
+              <a:ext cx="1667144" cy="499118"/>
+            </a:xfrm>
+            <a:prstGeom prst="rect">
+              <a:avLst/>
+            </a:prstGeom>
+            <a:noFill/>
+            <a:ln w="9525">
+              <a:noFill/>
+            </a:ln>
+          </p:spPr>
+          <p:txBody>
+            <a:bodyPr wrap="square" rtlCol="0">
+              <a:spAutoFit/>
+            </a:bodyPr>
+            <a:lstStyle/>
+            <a:p>
+              <a:r>
+                <a:rPr lang="zh-CN" altLang="en-US" sz="1000" dirty="0">
+                  <a:solidFill>
+                    <a:schemeClr val="bg2">
+                      <a:lumMod val="90000"/>
+                    </a:schemeClr>
+                  </a:solidFill>
+                </a:rPr>
+                <a:t>增加上下文处理接口</a:t>
+              </a:r>
+            </a:p>
+          </p:txBody>
+        </p:sp>
+      </p:grpSp>
+      <p:grpSp>
+        <p:nvGrpSpPr>
+          <p:cNvPr id="12" name="组合 11">
+            <a:extLst>
+              <a:ext uri="{FF2B5EF4-FFF2-40B4-BE49-F238E27FC236}">
+                <a16:creationId xmlns:a16="http://schemas.microsoft.com/office/drawing/2014/main" id="{19597B18-B6E3-4477-8179-CB86D1FFAEE6}"/>
+              </a:ext>
+            </a:extLst>
+          </p:cNvPr>
+          <p:cNvGrpSpPr/>
+          <p:nvPr/>
+        </p:nvGrpSpPr>
+        <p:grpSpPr>
+          <a:xfrm>
+            <a:off x="8263466" y="1473400"/>
+            <a:ext cx="2777067" cy="296134"/>
+            <a:chOff x="5812039" y="1043610"/>
+            <a:chExt cx="1667144" cy="892471"/>
+          </a:xfrm>
+        </p:grpSpPr>
+        <p:sp>
+          <p:nvSpPr>
+            <p:cNvPr id="13" name="矩形 12">
+              <a:extLst>
+                <a:ext uri="{FF2B5EF4-FFF2-40B4-BE49-F238E27FC236}">
+                  <a16:creationId xmlns:a16="http://schemas.microsoft.com/office/drawing/2014/main" id="{3532B277-A976-423F-9B73-217FDC80912D}"/>
+                </a:ext>
+              </a:extLst>
+            </p:cNvPr>
+            <p:cNvSpPr/>
+            <p:nvPr/>
+          </p:nvSpPr>
+          <p:spPr>
+            <a:xfrm>
+              <a:off x="5812039" y="1043610"/>
+              <a:ext cx="1667144" cy="892471"/>
+            </a:xfrm>
+            <a:prstGeom prst="rect">
+              <a:avLst/>
+            </a:prstGeom>
+            <a:noFill/>
+            <a:ln w="19050">
+              <a:solidFill>
+                <a:schemeClr val="tx1">
+                  <a:lumMod val="50000"/>
+                  <a:lumOff val="50000"/>
+                </a:schemeClr>
+              </a:solidFill>
+            </a:ln>
+          </p:spPr>
+          <p:style>
+            <a:lnRef idx="2">
+              <a:schemeClr val="accent1">
+                <a:shade val="50000"/>
+              </a:schemeClr>
+            </a:lnRef>
+            <a:fillRef idx="1">
+              <a:schemeClr val="accent1"/>
+            </a:fillRef>
+            <a:effectRef idx="0">
+              <a:schemeClr val="accent1"/>
+            </a:effectRef>
+            <a:fontRef idx="minor">
+              <a:schemeClr val="lt1"/>
+            </a:fontRef>
+          </p:style>
+          <p:txBody>
+            <a:bodyPr rtlCol="0" anchor="ctr"/>
+            <a:lstStyle/>
+            <a:p>
+              <a:pPr algn="ctr"/>
+              <a:endParaRPr lang="zh-CN" altLang="en-US"/>
+            </a:p>
+          </p:txBody>
+        </p:sp>
+        <p:sp>
+          <p:nvSpPr>
+            <p:cNvPr id="14" name="文本框 13">
+              <a:extLst>
+                <a:ext uri="{FF2B5EF4-FFF2-40B4-BE49-F238E27FC236}">
+                  <a16:creationId xmlns:a16="http://schemas.microsoft.com/office/drawing/2014/main" id="{8A8DA153-2814-410D-BCCB-C227FF0A2799}"/>
+                </a:ext>
+              </a:extLst>
+            </p:cNvPr>
+            <p:cNvSpPr txBox="1"/>
+            <p:nvPr/>
+          </p:nvSpPr>
+          <p:spPr>
+            <a:xfrm>
+              <a:off x="6518013" y="1085025"/>
+              <a:ext cx="961170" cy="742046"/>
+            </a:xfrm>
+            <a:prstGeom prst="rect">
+              <a:avLst/>
+            </a:prstGeom>
+            <a:noFill/>
+            <a:ln w="9525">
+              <a:noFill/>
+            </a:ln>
+          </p:spPr>
+          <p:txBody>
+            <a:bodyPr wrap="square" rtlCol="0">
+              <a:spAutoFit/>
+            </a:bodyPr>
+            <a:lstStyle/>
+            <a:p>
+              <a:r>
+                <a:rPr lang="zh-CN" altLang="en-US" sz="1000" dirty="0">
+                  <a:solidFill>
+                    <a:schemeClr val="bg2">
+                      <a:lumMod val="90000"/>
+                    </a:schemeClr>
+                  </a:solidFill>
+                </a:rPr>
+                <a:t>链接 </a:t>
+              </a:r>
+              <a:r>
+                <a:rPr lang="en-US" altLang="zh-CN" sz="1000" dirty="0">
+                  <a:solidFill>
+                    <a:schemeClr val="bg2">
+                      <a:lumMod val="90000"/>
+                    </a:schemeClr>
+                  </a:solidFill>
+                </a:rPr>
+                <a:t>beanPostProcessors</a:t>
+              </a:r>
+              <a:r>
+                <a:rPr lang="zh-CN" altLang="en-US" sz="1000" dirty="0">
+                  <a:solidFill>
+                    <a:schemeClr val="bg2">
+                      <a:lumMod val="90000"/>
+                    </a:schemeClr>
+                  </a:solidFill>
+                </a:rPr>
+                <a:t> </a:t>
+              </a:r>
+            </a:p>
+          </p:txBody>
+        </p:sp>
+      </p:grpSp>
+      <p:grpSp>
+        <p:nvGrpSpPr>
+          <p:cNvPr id="16" name="组合 15">
+            <a:extLst>
+              <a:ext uri="{FF2B5EF4-FFF2-40B4-BE49-F238E27FC236}">
+                <a16:creationId xmlns:a16="http://schemas.microsoft.com/office/drawing/2014/main" id="{D3712C0F-8AD8-46CB-B168-7BBBE57FD8F6}"/>
+              </a:ext>
+            </a:extLst>
+          </p:cNvPr>
+          <p:cNvGrpSpPr/>
+          <p:nvPr/>
+        </p:nvGrpSpPr>
+        <p:grpSpPr>
+          <a:xfrm>
+            <a:off x="7746999" y="2006800"/>
+            <a:ext cx="3776134" cy="1168200"/>
+            <a:chOff x="5812039" y="1043610"/>
+            <a:chExt cx="1667144" cy="892471"/>
+          </a:xfrm>
+        </p:grpSpPr>
+        <p:sp>
+          <p:nvSpPr>
+            <p:cNvPr id="17" name="矩形 16">
+              <a:extLst>
+                <a:ext uri="{FF2B5EF4-FFF2-40B4-BE49-F238E27FC236}">
+                  <a16:creationId xmlns:a16="http://schemas.microsoft.com/office/drawing/2014/main" id="{FFBEB896-D0CA-4647-9515-29EF6B8074D7}"/>
+                </a:ext>
+              </a:extLst>
+            </p:cNvPr>
+            <p:cNvSpPr/>
+            <p:nvPr/>
+          </p:nvSpPr>
+          <p:spPr>
+            <a:xfrm>
+              <a:off x="5812039" y="1043610"/>
+              <a:ext cx="1667144" cy="892471"/>
+            </a:xfrm>
+            <a:prstGeom prst="rect">
+              <a:avLst/>
+            </a:prstGeom>
+            <a:noFill/>
+            <a:ln w="19050">
+              <a:solidFill>
+                <a:schemeClr val="tx1">
+                  <a:lumMod val="50000"/>
+                  <a:lumOff val="50000"/>
+                </a:schemeClr>
+              </a:solidFill>
+            </a:ln>
+          </p:spPr>
+          <p:style>
+            <a:lnRef idx="2">
+              <a:schemeClr val="accent1">
+                <a:shade val="50000"/>
+              </a:schemeClr>
+            </a:lnRef>
+            <a:fillRef idx="1">
+              <a:schemeClr val="accent1"/>
+            </a:fillRef>
+            <a:effectRef idx="0">
+              <a:schemeClr val="accent1"/>
+            </a:effectRef>
+            <a:fontRef idx="minor">
+              <a:schemeClr val="lt1"/>
+            </a:fontRef>
+          </p:style>
+          <p:txBody>
+            <a:bodyPr rtlCol="0" anchor="ctr"/>
+            <a:lstStyle/>
+            <a:p>
+              <a:pPr algn="ctr"/>
+              <a:endParaRPr lang="zh-CN" altLang="en-US"/>
+            </a:p>
+          </p:txBody>
+        </p:sp>
+        <p:sp>
+          <p:nvSpPr>
+            <p:cNvPr id="18" name="文本框 17">
+              <a:extLst>
+                <a:ext uri="{FF2B5EF4-FFF2-40B4-BE49-F238E27FC236}">
+                  <a16:creationId xmlns:a16="http://schemas.microsoft.com/office/drawing/2014/main" id="{45AE3999-044D-4AAB-9ED2-C14865311DD1}"/>
+                </a:ext>
+              </a:extLst>
+            </p:cNvPr>
+            <p:cNvSpPr txBox="1"/>
+            <p:nvPr/>
+          </p:nvSpPr>
+          <p:spPr>
+            <a:xfrm>
+              <a:off x="5812039" y="1411989"/>
+              <a:ext cx="1667144" cy="423238"/>
+            </a:xfrm>
+            <a:prstGeom prst="rect">
+              <a:avLst/>
+            </a:prstGeom>
+            <a:noFill/>
+            <a:ln w="9525">
+              <a:noFill/>
+            </a:ln>
+          </p:spPr>
+          <p:txBody>
+            <a:bodyPr wrap="square" rtlCol="0">
+              <a:spAutoFit/>
+            </a:bodyPr>
+            <a:lstStyle/>
+            <a:p>
+              <a:r>
+                <a:rPr lang="zh-CN" altLang="en-US" sz="1000" dirty="0">
+                  <a:solidFill>
+                    <a:schemeClr val="bg2">
+                      <a:lumMod val="90000"/>
+                    </a:schemeClr>
+                  </a:solidFill>
+                </a:rPr>
+                <a:t>实现 </a:t>
+              </a:r>
+              <a:r>
+                <a:rPr lang="en-US" altLang="zh-CN" sz="1000" dirty="0">
+                  <a:solidFill>
+                    <a:schemeClr val="bg2">
+                      <a:lumMod val="90000"/>
+                    </a:schemeClr>
+                  </a:solidFill>
+                </a:rPr>
+                <a:t>AutowireCapableBeanFactory </a:t>
+              </a:r>
+              <a:r>
+                <a:rPr lang="zh-CN" altLang="en-US" sz="1000" dirty="0">
+                  <a:solidFill>
+                    <a:schemeClr val="bg2">
+                      <a:lumMod val="90000"/>
+                    </a:schemeClr>
+                  </a:solidFill>
+                </a:rPr>
+                <a:t>接口</a:t>
+              </a:r>
+              <a:endParaRPr lang="en-US" altLang="zh-CN" sz="1000" dirty="0">
+                <a:solidFill>
+                  <a:schemeClr val="bg2">
+                    <a:lumMod val="90000"/>
+                  </a:schemeClr>
+                </a:solidFill>
+              </a:endParaRPr>
+            </a:p>
+            <a:p>
+              <a:r>
+                <a:rPr lang="zh-CN" altLang="en-US" sz="1000" dirty="0">
+                  <a:solidFill>
+                    <a:schemeClr val="bg2">
+                      <a:lumMod val="90000"/>
+                    </a:schemeClr>
+                  </a:solidFill>
+                </a:rPr>
+                <a:t>从 </a:t>
+              </a:r>
+              <a:r>
+                <a:rPr lang="en-US" altLang="zh-CN" sz="1000" dirty="0">
+                  <a:solidFill>
+                    <a:schemeClr val="bg2">
+                      <a:lumMod val="90000"/>
+                    </a:schemeClr>
+                  </a:solidFill>
+                </a:rPr>
+                <a:t>AbstractBeanFactory </a:t>
+              </a:r>
+              <a:r>
+                <a:rPr lang="zh-CN" altLang="en-US" sz="1000" dirty="0">
+                  <a:solidFill>
+                    <a:schemeClr val="bg2">
+                      <a:lumMod val="90000"/>
+                    </a:schemeClr>
+                  </a:solidFill>
+                </a:rPr>
+                <a:t>处链接 </a:t>
+              </a:r>
+              <a:r>
+                <a:rPr lang="en-US" altLang="zh-CN" sz="1000" dirty="0">
+                  <a:solidFill>
+                    <a:schemeClr val="bg2">
+                      <a:lumMod val="90000"/>
+                    </a:schemeClr>
+                  </a:solidFill>
+                </a:rPr>
+                <a:t>beanPostProcessors</a:t>
+              </a:r>
+            </a:p>
+            <a:p>
+              <a:r>
+                <a:rPr lang="zh-CN" altLang="en-US" sz="1000" dirty="0">
+                  <a:solidFill>
+                    <a:schemeClr val="bg2">
+                      <a:lumMod val="90000"/>
+                    </a:schemeClr>
+                  </a:solidFill>
+                </a:rPr>
+                <a:t>并从 </a:t>
+              </a:r>
+              <a:r>
+                <a:rPr lang="en-US" altLang="zh-CN" sz="1000" dirty="0">
+                  <a:solidFill>
+                    <a:schemeClr val="bg2">
+                      <a:lumMod val="90000"/>
+                    </a:schemeClr>
+                  </a:solidFill>
+                </a:rPr>
+                <a:t>AutowireCapableBeanFactory</a:t>
+              </a:r>
+              <a:r>
+                <a:rPr lang="zh-CN" altLang="en-US" sz="1000" dirty="0">
+                  <a:solidFill>
+                    <a:schemeClr val="bg2">
+                      <a:lumMod val="90000"/>
+                    </a:schemeClr>
+                  </a:solidFill>
+                </a:rPr>
+                <a:t> 处实现相应操作</a:t>
+              </a:r>
+            </a:p>
+          </p:txBody>
+        </p:sp>
+      </p:grpSp>
+      <p:grpSp>
+        <p:nvGrpSpPr>
+          <p:cNvPr id="19" name="组合 18">
+            <a:extLst>
+              <a:ext uri="{FF2B5EF4-FFF2-40B4-BE49-F238E27FC236}">
+                <a16:creationId xmlns:a16="http://schemas.microsoft.com/office/drawing/2014/main" id="{B75244C6-C59B-4C1A-A61D-A81372CE5B87}"/>
+              </a:ext>
+            </a:extLst>
+          </p:cNvPr>
+          <p:cNvGrpSpPr/>
+          <p:nvPr/>
+        </p:nvGrpSpPr>
+        <p:grpSpPr>
+          <a:xfrm>
+            <a:off x="381000" y="5740399"/>
+            <a:ext cx="4910667" cy="482599"/>
+            <a:chOff x="5812039" y="1043610"/>
+            <a:chExt cx="1667144" cy="892471"/>
+          </a:xfrm>
+        </p:grpSpPr>
+        <p:sp>
+          <p:nvSpPr>
+            <p:cNvPr id="20" name="矩形 19">
+              <a:extLst>
+                <a:ext uri="{FF2B5EF4-FFF2-40B4-BE49-F238E27FC236}">
+                  <a16:creationId xmlns:a16="http://schemas.microsoft.com/office/drawing/2014/main" id="{89DB3684-1B66-4CE7-A8CB-D564F04A400C}"/>
+                </a:ext>
+              </a:extLst>
+            </p:cNvPr>
+            <p:cNvSpPr/>
+            <p:nvPr/>
+          </p:nvSpPr>
+          <p:spPr>
+            <a:xfrm>
+              <a:off x="5812039" y="1043610"/>
+              <a:ext cx="1667144" cy="892471"/>
+            </a:xfrm>
+            <a:prstGeom prst="rect">
+              <a:avLst/>
+            </a:prstGeom>
+            <a:noFill/>
+            <a:ln w="19050">
+              <a:solidFill>
+                <a:schemeClr val="tx1">
+                  <a:lumMod val="50000"/>
+                  <a:lumOff val="50000"/>
+                </a:schemeClr>
+              </a:solidFill>
+            </a:ln>
+          </p:spPr>
+          <p:style>
+            <a:lnRef idx="2">
+              <a:schemeClr val="accent1">
+                <a:shade val="50000"/>
+              </a:schemeClr>
+            </a:lnRef>
+            <a:fillRef idx="1">
+              <a:schemeClr val="accent1"/>
+            </a:fillRef>
+            <a:effectRef idx="0">
+              <a:schemeClr val="accent1"/>
+            </a:effectRef>
+            <a:fontRef idx="minor">
+              <a:schemeClr val="lt1"/>
+            </a:fontRef>
+          </p:style>
+          <p:txBody>
+            <a:bodyPr rtlCol="0" anchor="ctr"/>
+            <a:lstStyle/>
+            <a:p>
+              <a:pPr algn="ctr"/>
+              <a:endParaRPr lang="zh-CN" altLang="en-US"/>
+            </a:p>
+          </p:txBody>
+        </p:sp>
+        <p:sp>
+          <p:nvSpPr>
+            <p:cNvPr id="21" name="文本框 20">
+              <a:extLst>
+                <a:ext uri="{FF2B5EF4-FFF2-40B4-BE49-F238E27FC236}">
+                  <a16:creationId xmlns:a16="http://schemas.microsoft.com/office/drawing/2014/main" id="{7D962399-4C3E-4251-873B-0BD12ADFE0AE}"/>
+                </a:ext>
+              </a:extLst>
+            </p:cNvPr>
+            <p:cNvSpPr txBox="1"/>
+            <p:nvPr/>
+          </p:nvSpPr>
+          <p:spPr>
+            <a:xfrm>
+              <a:off x="5812039" y="1043610"/>
+              <a:ext cx="1667144" cy="529676"/>
+            </a:xfrm>
+            <a:prstGeom prst="rect">
+              <a:avLst/>
+            </a:prstGeom>
+            <a:noFill/>
+            <a:ln w="9525">
+              <a:noFill/>
+            </a:ln>
+          </p:spPr>
+          <p:txBody>
+            <a:bodyPr wrap="square" rtlCol="0">
+              <a:spAutoFit/>
+            </a:bodyPr>
+            <a:lstStyle/>
+            <a:p>
+              <a:r>
+                <a:rPr lang="zh-CN" altLang="en-US" sz="1000" dirty="0">
+                  <a:solidFill>
+                    <a:schemeClr val="bg2">
+                      <a:lumMod val="90000"/>
+                    </a:schemeClr>
+                  </a:solidFill>
+                </a:rPr>
+                <a:t>两者在测试中实现自定义的 </a:t>
+              </a:r>
+              <a:r>
+                <a:rPr lang="en-US" altLang="zh-CN" sz="1000" dirty="0">
+                  <a:solidFill>
+                    <a:schemeClr val="bg2">
+                      <a:lumMod val="90000"/>
+                    </a:schemeClr>
+                  </a:solidFill>
+                </a:rPr>
+                <a:t>Processor</a:t>
+              </a:r>
+              <a:endParaRPr lang="zh-CN" altLang="en-US" sz="1000" dirty="0">
+                <a:solidFill>
+                  <a:schemeClr val="bg2">
+                    <a:lumMod val="90000"/>
+                  </a:schemeClr>
+                </a:solidFill>
+              </a:endParaRPr>
+            </a:p>
+          </p:txBody>
+        </p:sp>
+      </p:grpSp>
+      <p:grpSp>
+        <p:nvGrpSpPr>
+          <p:cNvPr id="22" name="组合 21">
+            <a:extLst>
+              <a:ext uri="{FF2B5EF4-FFF2-40B4-BE49-F238E27FC236}">
+                <a16:creationId xmlns:a16="http://schemas.microsoft.com/office/drawing/2014/main" id="{733073C3-E74F-4153-BF89-1DD68445897C}"/>
+              </a:ext>
+            </a:extLst>
+          </p:cNvPr>
+          <p:cNvGrpSpPr/>
+          <p:nvPr/>
+        </p:nvGrpSpPr>
+        <p:grpSpPr>
+          <a:xfrm>
+            <a:off x="739140" y="2006800"/>
+            <a:ext cx="3429000" cy="296133"/>
+            <a:chOff x="5812039" y="1043610"/>
+            <a:chExt cx="1667144" cy="892471"/>
+          </a:xfrm>
+        </p:grpSpPr>
+        <p:sp>
+          <p:nvSpPr>
+            <p:cNvPr id="23" name="矩形 22">
+              <a:extLst>
+                <a:ext uri="{FF2B5EF4-FFF2-40B4-BE49-F238E27FC236}">
+                  <a16:creationId xmlns:a16="http://schemas.microsoft.com/office/drawing/2014/main" id="{3C654524-3E4F-4589-ABC5-1E89C5DAEB6A}"/>
+                </a:ext>
+              </a:extLst>
+            </p:cNvPr>
+            <p:cNvSpPr/>
+            <p:nvPr/>
+          </p:nvSpPr>
+          <p:spPr>
+            <a:xfrm>
+              <a:off x="5812039" y="1043610"/>
+              <a:ext cx="1667144" cy="892471"/>
+            </a:xfrm>
+            <a:prstGeom prst="rect">
+              <a:avLst/>
+            </a:prstGeom>
+            <a:noFill/>
+            <a:ln w="19050">
+              <a:solidFill>
+                <a:schemeClr val="tx1">
+                  <a:lumMod val="50000"/>
+                  <a:lumOff val="50000"/>
+                </a:schemeClr>
+              </a:solidFill>
+            </a:ln>
+          </p:spPr>
+          <p:style>
+            <a:lnRef idx="2">
+              <a:schemeClr val="accent1">
+                <a:shade val="50000"/>
+              </a:schemeClr>
+            </a:lnRef>
+            <a:fillRef idx="1">
+              <a:schemeClr val="accent1"/>
+            </a:fillRef>
+            <a:effectRef idx="0">
+              <a:schemeClr val="accent1"/>
+            </a:effectRef>
+            <a:fontRef idx="minor">
+              <a:schemeClr val="lt1"/>
+            </a:fontRef>
+          </p:style>
+          <p:txBody>
+            <a:bodyPr rtlCol="0" anchor="ctr"/>
+            <a:lstStyle/>
+            <a:p>
+              <a:pPr algn="ctr"/>
+              <a:endParaRPr lang="zh-CN" altLang="en-US"/>
+            </a:p>
+          </p:txBody>
+        </p:sp>
+        <p:sp>
+          <p:nvSpPr>
+            <p:cNvPr id="24" name="文本框 23">
+              <a:extLst>
+                <a:ext uri="{FF2B5EF4-FFF2-40B4-BE49-F238E27FC236}">
+                  <a16:creationId xmlns:a16="http://schemas.microsoft.com/office/drawing/2014/main" id="{7D1C8AC9-0F3B-4B2F-86A4-5041B848B9C5}"/>
+                </a:ext>
+              </a:extLst>
+            </p:cNvPr>
+            <p:cNvSpPr txBox="1"/>
+            <p:nvPr/>
+          </p:nvSpPr>
+          <p:spPr>
+            <a:xfrm>
+              <a:off x="5812039" y="1084308"/>
+              <a:ext cx="1667144" cy="742049"/>
+            </a:xfrm>
+            <a:prstGeom prst="rect">
+              <a:avLst/>
+            </a:prstGeom>
+            <a:noFill/>
+            <a:ln w="9525">
+              <a:noFill/>
+            </a:ln>
+          </p:spPr>
+          <p:txBody>
+            <a:bodyPr wrap="square" rtlCol="0">
+              <a:spAutoFit/>
+            </a:bodyPr>
+            <a:lstStyle/>
+            <a:p>
+              <a:r>
+                <a:rPr lang="zh-CN" altLang="en-US" sz="1000" dirty="0">
+                  <a:solidFill>
+                    <a:schemeClr val="bg2">
+                      <a:lumMod val="90000"/>
+                    </a:schemeClr>
+                  </a:solidFill>
+                </a:rPr>
+                <a:t>链接 </a:t>
+              </a:r>
+              <a:r>
+                <a:rPr lang="en-US" altLang="zh-CN" sz="1000" dirty="0">
+                  <a:solidFill>
+                    <a:schemeClr val="bg2">
+                      <a:lumMod val="90000"/>
+                    </a:schemeClr>
+                  </a:solidFill>
+                </a:rPr>
+                <a:t>ResourceLoader </a:t>
+              </a:r>
+              <a:r>
+                <a:rPr lang="zh-CN" altLang="en-US" sz="1000" dirty="0">
+                  <a:solidFill>
+                    <a:schemeClr val="bg2">
+                      <a:lumMod val="90000"/>
+                    </a:schemeClr>
+                  </a:solidFill>
+                </a:rPr>
+                <a:t>和 </a:t>
+              </a:r>
+              <a:r>
+                <a:rPr lang="en-US" altLang="zh-CN" sz="1000" dirty="0">
+                  <a:solidFill>
+                    <a:schemeClr val="bg2">
+                      <a:lumMod val="90000"/>
+                    </a:schemeClr>
+                  </a:solidFill>
+                </a:rPr>
+                <a:t>Context</a:t>
+              </a:r>
+              <a:endParaRPr lang="zh-CN" altLang="en-US" sz="1000" dirty="0">
+                <a:solidFill>
+                  <a:schemeClr val="bg2">
+                    <a:lumMod val="90000"/>
+                  </a:schemeClr>
+                </a:solidFill>
+              </a:endParaRPr>
+            </a:p>
+          </p:txBody>
+        </p:sp>
+      </p:grpSp>
+      <p:sp>
+        <p:nvSpPr>
+          <p:cNvPr id="25" name="矩形 24">
+            <a:extLst>
+              <a:ext uri="{FF2B5EF4-FFF2-40B4-BE49-F238E27FC236}">
+                <a16:creationId xmlns:a16="http://schemas.microsoft.com/office/drawing/2014/main" id="{6C488F61-C70A-439A-AD3D-E3DE69A840E0}"/>
+              </a:ext>
+            </a:extLst>
+          </p:cNvPr>
+          <p:cNvSpPr/>
+          <p:nvPr/>
+        </p:nvSpPr>
+        <p:spPr>
+          <a:xfrm>
+            <a:off x="668866" y="804337"/>
+            <a:ext cx="4146695" cy="2944703"/>
+          </a:xfrm>
+          <a:prstGeom prst="rect">
+            <a:avLst/>
+          </a:prstGeom>
+          <a:noFill/>
+          <a:ln w="19050">
+            <a:solidFill>
+              <a:srgbClr val="C00000"/>
+            </a:solidFill>
+          </a:ln>
+        </p:spPr>
+        <p:style>
+          <a:lnRef idx="2">
+            <a:schemeClr val="accent1">
+              <a:shade val="50000"/>
+            </a:schemeClr>
+          </a:lnRef>
+          <a:fillRef idx="1">
+            <a:schemeClr val="accent1"/>
+          </a:fillRef>
+          <a:effectRef idx="0">
+            <a:schemeClr val="accent1"/>
+          </a:effectRef>
+          <a:fontRef idx="minor">
+            <a:schemeClr val="lt1"/>
+          </a:fontRef>
+        </p:style>
+        <p:txBody>
+          <a:bodyPr rtlCol="0" anchor="ctr"/>
+          <a:lstStyle/>
+          <a:p>
+            <a:pPr algn="ctr"/>
+            <a:endParaRPr lang="zh-CN" altLang="en-US">
+              <a:solidFill>
+                <a:srgbClr val="C00000"/>
+              </a:solidFill>
+            </a:endParaRPr>
+          </a:p>
+        </p:txBody>
+      </p:sp>
+      <p:grpSp>
+        <p:nvGrpSpPr>
+          <p:cNvPr id="26" name="组合 25">
+            <a:extLst>
+              <a:ext uri="{FF2B5EF4-FFF2-40B4-BE49-F238E27FC236}">
+                <a16:creationId xmlns:a16="http://schemas.microsoft.com/office/drawing/2014/main" id="{BB27A272-B1A2-48A2-84C2-E58EF4DBF56F}"/>
+              </a:ext>
+            </a:extLst>
+          </p:cNvPr>
+          <p:cNvGrpSpPr/>
+          <p:nvPr/>
+        </p:nvGrpSpPr>
+        <p:grpSpPr>
+          <a:xfrm>
+            <a:off x="1005839" y="5250181"/>
+            <a:ext cx="2514601" cy="403859"/>
+            <a:chOff x="5812039" y="1043610"/>
+            <a:chExt cx="1667144" cy="892471"/>
+          </a:xfrm>
+        </p:grpSpPr>
+        <p:sp>
+          <p:nvSpPr>
+            <p:cNvPr id="27" name="矩形 26">
+              <a:extLst>
+                <a:ext uri="{FF2B5EF4-FFF2-40B4-BE49-F238E27FC236}">
+                  <a16:creationId xmlns:a16="http://schemas.microsoft.com/office/drawing/2014/main" id="{5D8E707B-03CB-4189-BB40-A07AE308E050}"/>
+                </a:ext>
+              </a:extLst>
+            </p:cNvPr>
+            <p:cNvSpPr/>
+            <p:nvPr/>
+          </p:nvSpPr>
+          <p:spPr>
+            <a:xfrm>
+              <a:off x="5812039" y="1043610"/>
+              <a:ext cx="1667144" cy="892471"/>
+            </a:xfrm>
+            <a:prstGeom prst="rect">
+              <a:avLst/>
+            </a:prstGeom>
+            <a:noFill/>
+            <a:ln w="19050">
+              <a:solidFill>
+                <a:schemeClr val="tx1">
+                  <a:lumMod val="50000"/>
+                  <a:lumOff val="50000"/>
+                </a:schemeClr>
+              </a:solidFill>
+            </a:ln>
+          </p:spPr>
+          <p:style>
+            <a:lnRef idx="2">
+              <a:schemeClr val="accent1">
+                <a:shade val="50000"/>
+              </a:schemeClr>
+            </a:lnRef>
+            <a:fillRef idx="1">
+              <a:schemeClr val="accent1"/>
+            </a:fillRef>
+            <a:effectRef idx="0">
+              <a:schemeClr val="accent1"/>
+            </a:effectRef>
+            <a:fontRef idx="minor">
+              <a:schemeClr val="lt1"/>
+            </a:fontRef>
+          </p:style>
+          <p:txBody>
+            <a:bodyPr rtlCol="0" anchor="ctr"/>
+            <a:lstStyle/>
+            <a:p>
+              <a:pPr algn="ctr"/>
+              <a:endParaRPr lang="zh-CN" altLang="en-US"/>
+            </a:p>
+          </p:txBody>
+        </p:sp>
+        <p:sp>
+          <p:nvSpPr>
+            <p:cNvPr id="28" name="文本框 27">
+              <a:extLst>
+                <a:ext uri="{FF2B5EF4-FFF2-40B4-BE49-F238E27FC236}">
+                  <a16:creationId xmlns:a16="http://schemas.microsoft.com/office/drawing/2014/main" id="{B2DB2900-905A-44E0-80AA-4E0D3E28C0A6}"/>
+                </a:ext>
+              </a:extLst>
+            </p:cNvPr>
+            <p:cNvSpPr txBox="1"/>
+            <p:nvPr/>
+          </p:nvSpPr>
+          <p:spPr>
+            <a:xfrm>
+              <a:off x="5812039" y="1051895"/>
+              <a:ext cx="1355334" cy="884186"/>
+            </a:xfrm>
+            <a:prstGeom prst="rect">
+              <a:avLst/>
+            </a:prstGeom>
+            <a:noFill/>
+            <a:ln w="9525">
+              <a:noFill/>
+            </a:ln>
+          </p:spPr>
+          <p:txBody>
+            <a:bodyPr wrap="square" rtlCol="0">
+              <a:spAutoFit/>
+            </a:bodyPr>
+            <a:lstStyle/>
+            <a:p>
+              <a:r>
+                <a:rPr lang="zh-CN" altLang="en-US" sz="1000" dirty="0">
+                  <a:solidFill>
+                    <a:schemeClr val="bg2">
+                      <a:lumMod val="90000"/>
+                    </a:schemeClr>
+                  </a:solidFill>
+                </a:rPr>
+                <a:t>获取 </a:t>
+              </a:r>
+              <a:r>
+                <a:rPr lang="en-US" altLang="zh-CN" sz="1000" dirty="0">
+                  <a:solidFill>
+                    <a:schemeClr val="bg2">
+                      <a:lumMod val="90000"/>
+                    </a:schemeClr>
+                  </a:solidFill>
+                </a:rPr>
+                <a:t>factory </a:t>
+              </a:r>
+              <a:r>
+                <a:rPr lang="zh-CN" altLang="en-US" sz="1000" dirty="0">
+                  <a:solidFill>
+                    <a:schemeClr val="bg2">
+                      <a:lumMod val="90000"/>
+                    </a:schemeClr>
+                  </a:solidFill>
+                </a:rPr>
+                <a:t>中的 </a:t>
+              </a:r>
+              <a:r>
+                <a:rPr lang="en-US" altLang="zh-CN" sz="1000" dirty="0">
+                  <a:solidFill>
+                    <a:schemeClr val="bg2">
+                      <a:lumMod val="90000"/>
+                    </a:schemeClr>
+                  </a:solidFill>
+                </a:rPr>
+                <a:t>beanDefinition</a:t>
+              </a:r>
+              <a:r>
+                <a:rPr lang="zh-CN" altLang="en-US" sz="1000" dirty="0">
+                  <a:solidFill>
+                    <a:schemeClr val="bg2">
+                      <a:lumMod val="90000"/>
+                    </a:schemeClr>
+                  </a:solidFill>
+                </a:rPr>
+                <a:t> </a:t>
+              </a:r>
+              <a:endParaRPr lang="en-US" altLang="zh-CN" sz="1000" dirty="0">
+                <a:solidFill>
+                  <a:schemeClr val="bg2">
+                    <a:lumMod val="90000"/>
+                  </a:schemeClr>
+                </a:solidFill>
+              </a:endParaRPr>
+            </a:p>
+            <a:p>
+              <a:r>
+                <a:rPr lang="zh-CN" altLang="en-US" sz="1000" dirty="0">
+                  <a:solidFill>
+                    <a:schemeClr val="bg2">
+                      <a:lumMod val="90000"/>
+                    </a:schemeClr>
+                  </a:solidFill>
+                </a:rPr>
+                <a:t>进行自定义配置</a:t>
+              </a:r>
+            </a:p>
+          </p:txBody>
+        </p:sp>
+      </p:grpSp>
+      <p:grpSp>
+        <p:nvGrpSpPr>
+          <p:cNvPr id="29" name="组合 28">
+            <a:extLst>
+              <a:ext uri="{FF2B5EF4-FFF2-40B4-BE49-F238E27FC236}">
+                <a16:creationId xmlns:a16="http://schemas.microsoft.com/office/drawing/2014/main" id="{66EB06F6-A5F7-48EE-B6D4-789331768A49}"/>
+              </a:ext>
+            </a:extLst>
+          </p:cNvPr>
+          <p:cNvGrpSpPr/>
+          <p:nvPr/>
+        </p:nvGrpSpPr>
+        <p:grpSpPr>
+          <a:xfrm>
+            <a:off x="3874813" y="5044440"/>
+            <a:ext cx="1283927" cy="573960"/>
+            <a:chOff x="5812039" y="1043610"/>
+            <a:chExt cx="1667145" cy="892471"/>
+          </a:xfrm>
+        </p:grpSpPr>
+        <p:sp>
+          <p:nvSpPr>
+            <p:cNvPr id="30" name="矩形 29">
+              <a:extLst>
+                <a:ext uri="{FF2B5EF4-FFF2-40B4-BE49-F238E27FC236}">
+                  <a16:creationId xmlns:a16="http://schemas.microsoft.com/office/drawing/2014/main" id="{BBD82BBA-FFE8-4706-A2DF-CED33ED5F9EF}"/>
+                </a:ext>
+              </a:extLst>
+            </p:cNvPr>
+            <p:cNvSpPr/>
+            <p:nvPr/>
+          </p:nvSpPr>
+          <p:spPr>
+            <a:xfrm>
+              <a:off x="5812039" y="1043610"/>
+              <a:ext cx="1667144" cy="892471"/>
+            </a:xfrm>
+            <a:prstGeom prst="rect">
+              <a:avLst/>
+            </a:prstGeom>
+            <a:noFill/>
+            <a:ln w="19050">
+              <a:solidFill>
+                <a:schemeClr val="tx1">
+                  <a:lumMod val="50000"/>
+                  <a:lumOff val="50000"/>
+                </a:schemeClr>
+              </a:solidFill>
+            </a:ln>
+          </p:spPr>
+          <p:style>
+            <a:lnRef idx="2">
+              <a:schemeClr val="accent1">
+                <a:shade val="50000"/>
+              </a:schemeClr>
+            </a:lnRef>
+            <a:fillRef idx="1">
+              <a:schemeClr val="accent1"/>
+            </a:fillRef>
+            <a:effectRef idx="0">
+              <a:schemeClr val="accent1"/>
+            </a:effectRef>
+            <a:fontRef idx="minor">
+              <a:schemeClr val="lt1"/>
+            </a:fontRef>
+          </p:style>
+          <p:txBody>
+            <a:bodyPr rtlCol="0" anchor="ctr"/>
+            <a:lstStyle/>
+            <a:p>
+              <a:pPr algn="ctr"/>
+              <a:endParaRPr lang="zh-CN" altLang="en-US"/>
+            </a:p>
+          </p:txBody>
+        </p:sp>
+        <p:sp>
+          <p:nvSpPr>
+            <p:cNvPr id="31" name="文本框 30">
+              <a:extLst>
+                <a:ext uri="{FF2B5EF4-FFF2-40B4-BE49-F238E27FC236}">
+                  <a16:creationId xmlns:a16="http://schemas.microsoft.com/office/drawing/2014/main" id="{78AA86E2-C8DB-4B50-80F5-D559182E2B3E}"/>
+                </a:ext>
+              </a:extLst>
+            </p:cNvPr>
+            <p:cNvSpPr txBox="1"/>
+            <p:nvPr/>
+          </p:nvSpPr>
+          <p:spPr>
+            <a:xfrm>
+              <a:off x="5812040" y="1043610"/>
+              <a:ext cx="1667144" cy="463469"/>
+            </a:xfrm>
+            <a:prstGeom prst="rect">
+              <a:avLst/>
+            </a:prstGeom>
+            <a:noFill/>
+            <a:ln w="9525">
+              <a:noFill/>
+            </a:ln>
+          </p:spPr>
+          <p:txBody>
+            <a:bodyPr wrap="square" rtlCol="0">
+              <a:spAutoFit/>
+            </a:bodyPr>
+            <a:lstStyle/>
+            <a:p>
+              <a:r>
+                <a:rPr lang="en-US" altLang="zh-CN" sz="1000" dirty="0">
+                  <a:solidFill>
+                    <a:schemeClr val="bg2">
+                      <a:lumMod val="90000"/>
+                    </a:schemeClr>
+                  </a:solidFill>
+                </a:rPr>
+                <a:t>bean </a:t>
+              </a:r>
+              <a:r>
+                <a:rPr lang="zh-CN" altLang="en-US" sz="1000" dirty="0">
+                  <a:solidFill>
+                    <a:schemeClr val="bg2">
+                      <a:lumMod val="90000"/>
+                    </a:schemeClr>
+                  </a:solidFill>
+                </a:rPr>
+                <a:t>实例化后进行操作（</a:t>
+              </a:r>
+              <a:r>
+                <a:rPr lang="en-US" altLang="zh-CN" sz="1000" dirty="0">
+                  <a:solidFill>
+                    <a:schemeClr val="bg2">
+                      <a:lumMod val="90000"/>
+                    </a:schemeClr>
+                  </a:solidFill>
+                </a:rPr>
+                <a:t>get/set…</a:t>
+              </a:r>
+              <a:r>
+                <a:rPr lang="zh-CN" altLang="en-US" sz="1000" dirty="0">
+                  <a:solidFill>
+                    <a:schemeClr val="bg2">
+                      <a:lumMod val="90000"/>
+                    </a:schemeClr>
+                  </a:solidFill>
+                </a:rPr>
+                <a:t>）</a:t>
+              </a:r>
+            </a:p>
+          </p:txBody>
+        </p:sp>
+      </p:grpSp>
+      <p:grpSp>
+        <p:nvGrpSpPr>
+          <p:cNvPr id="32" name="组合 31">
+            <a:extLst>
+              <a:ext uri="{FF2B5EF4-FFF2-40B4-BE49-F238E27FC236}">
+                <a16:creationId xmlns:a16="http://schemas.microsoft.com/office/drawing/2014/main" id="{30A3E339-B8A4-478F-A27A-64FFE36BA638}"/>
+              </a:ext>
+            </a:extLst>
+          </p:cNvPr>
+          <p:cNvGrpSpPr/>
+          <p:nvPr/>
+        </p:nvGrpSpPr>
+        <p:grpSpPr>
+          <a:xfrm>
+            <a:off x="1697578" y="2966071"/>
+            <a:ext cx="2705099" cy="296133"/>
+            <a:chOff x="5812039" y="1043610"/>
+            <a:chExt cx="1667144" cy="892471"/>
+          </a:xfrm>
+        </p:grpSpPr>
+        <p:sp>
+          <p:nvSpPr>
+            <p:cNvPr id="33" name="矩形 32">
+              <a:extLst>
+                <a:ext uri="{FF2B5EF4-FFF2-40B4-BE49-F238E27FC236}">
+                  <a16:creationId xmlns:a16="http://schemas.microsoft.com/office/drawing/2014/main" id="{9EC1D303-EAE6-45E3-B41D-0B83D4F93FD4}"/>
+                </a:ext>
+              </a:extLst>
+            </p:cNvPr>
+            <p:cNvSpPr/>
+            <p:nvPr/>
+          </p:nvSpPr>
+          <p:spPr>
+            <a:xfrm>
+              <a:off x="5812039" y="1043610"/>
+              <a:ext cx="1667144" cy="892471"/>
+            </a:xfrm>
+            <a:prstGeom prst="rect">
+              <a:avLst/>
+            </a:prstGeom>
+            <a:noFill/>
+            <a:ln w="19050">
+              <a:solidFill>
+                <a:schemeClr val="tx1">
+                  <a:lumMod val="50000"/>
+                  <a:lumOff val="50000"/>
+                </a:schemeClr>
+              </a:solidFill>
+            </a:ln>
+          </p:spPr>
+          <p:style>
+            <a:lnRef idx="2">
+              <a:schemeClr val="accent1">
+                <a:shade val="50000"/>
+              </a:schemeClr>
+            </a:lnRef>
+            <a:fillRef idx="1">
+              <a:schemeClr val="accent1"/>
+            </a:fillRef>
+            <a:effectRef idx="0">
+              <a:schemeClr val="accent1"/>
+            </a:effectRef>
+            <a:fontRef idx="minor">
+              <a:schemeClr val="lt1"/>
+            </a:fontRef>
+          </p:style>
+          <p:txBody>
+            <a:bodyPr rtlCol="0" anchor="ctr"/>
+            <a:lstStyle/>
+            <a:p>
+              <a:pPr algn="ctr"/>
+              <a:endParaRPr lang="zh-CN" altLang="en-US"/>
+            </a:p>
+          </p:txBody>
+        </p:sp>
+        <p:sp>
+          <p:nvSpPr>
+            <p:cNvPr id="34" name="文本框 33">
+              <a:extLst>
+                <a:ext uri="{FF2B5EF4-FFF2-40B4-BE49-F238E27FC236}">
+                  <a16:creationId xmlns:a16="http://schemas.microsoft.com/office/drawing/2014/main" id="{FEDC456D-4AC6-4AA0-9E86-7F3C8F154234}"/>
+                </a:ext>
+              </a:extLst>
+            </p:cNvPr>
+            <p:cNvSpPr txBox="1"/>
+            <p:nvPr/>
+          </p:nvSpPr>
+          <p:spPr>
+            <a:xfrm>
+              <a:off x="5812039" y="1118625"/>
+              <a:ext cx="1220281" cy="742049"/>
+            </a:xfrm>
+            <a:prstGeom prst="rect">
+              <a:avLst/>
+            </a:prstGeom>
+            <a:noFill/>
+            <a:ln w="9525">
+              <a:noFill/>
+            </a:ln>
+          </p:spPr>
+          <p:txBody>
+            <a:bodyPr wrap="square" rtlCol="0">
+              <a:spAutoFit/>
+            </a:bodyPr>
+            <a:lstStyle/>
+            <a:p>
+              <a:r>
+                <a:rPr lang="zh-CN" altLang="en-US" sz="1000" dirty="0">
+                  <a:solidFill>
+                    <a:schemeClr val="bg2">
+                      <a:lumMod val="90000"/>
+                    </a:schemeClr>
+                  </a:solidFill>
+                </a:rPr>
+                <a:t>链接 </a:t>
+              </a:r>
+              <a:r>
+                <a:rPr lang="en-US" altLang="zh-CN" sz="1000" dirty="0">
+                  <a:solidFill>
+                    <a:schemeClr val="bg2">
+                      <a:lumMod val="90000"/>
+                    </a:schemeClr>
+                  </a:solidFill>
+                </a:rPr>
+                <a:t>reader</a:t>
+              </a:r>
+              <a:endParaRPr lang="zh-CN" altLang="en-US" sz="1000" dirty="0">
+                <a:solidFill>
+                  <a:schemeClr val="bg2">
+                    <a:lumMod val="90000"/>
+                  </a:schemeClr>
+                </a:solidFill>
+              </a:endParaRPr>
+            </a:p>
+          </p:txBody>
+        </p:sp>
+      </p:grpSp>
     </p:spTree>
     <p:extLst>
       <p:ext uri="{BB962C8B-B14F-4D97-AF65-F5344CB8AC3E}">

</xml_diff>